<commit_message>
added future work presentation
</commit_message>
<xml_diff>
--- a/LateX/Presentation/Ανιχνευση μη τεχνικων απωλειων με συστηματα μηχανικης μαθησης.pptx
+++ b/LateX/Presentation/Ανιχνευση μη τεχνικων απωλειων με συστηματα μηχανικης μαθησης.pptx
@@ -22,6 +22,8 @@
     <p:sldId id="271" r:id="rId16"/>
     <p:sldId id="267" r:id="rId17"/>
     <p:sldId id="268" r:id="rId18"/>
+    <p:sldId id="274" r:id="rId19"/>
+    <p:sldId id="275" r:id="rId20"/>
   </p:sldIdLst>
   <p:sldSz cx="12192000" cy="6858000"/>
   <p:notesSz cx="6858000" cy="9144000"/>
@@ -374,7 +376,7 @@
             <a:fld id="{B61BEF0D-F0BB-DE4B-95CE-6DB70DBA9567}" type="datetimeFigureOut">
               <a:rPr lang="en-US" dirty="0"/>
               <a:pPr/>
-              <a:t>10/11/2017</a:t>
+              <a:t>10/16/2017</a:t>
             </a:fld>
             <a:endParaRPr lang="en-US" dirty="0"/>
           </a:p>
@@ -633,7 +635,7 @@
             <a:fld id="{B61BEF0D-F0BB-DE4B-95CE-6DB70DBA9567}" type="datetimeFigureOut">
               <a:rPr lang="en-US" dirty="0"/>
               <a:pPr/>
-              <a:t>10/11/2017</a:t>
+              <a:t>10/16/2017</a:t>
             </a:fld>
             <a:endParaRPr lang="en-US" dirty="0"/>
           </a:p>
@@ -865,7 +867,7 @@
             <a:fld id="{B61BEF0D-F0BB-DE4B-95CE-6DB70DBA9567}" type="datetimeFigureOut">
               <a:rPr lang="en-US" dirty="0"/>
               <a:pPr/>
-              <a:t>10/11/2017</a:t>
+              <a:t>10/16/2017</a:t>
             </a:fld>
             <a:endParaRPr lang="en-US" dirty="0"/>
           </a:p>
@@ -1102,7 +1104,7 @@
             <a:fld id="{B61BEF0D-F0BB-DE4B-95CE-6DB70DBA9567}" type="datetimeFigureOut">
               <a:rPr lang="en-US" dirty="0"/>
               <a:pPr/>
-              <a:t>10/11/2017</a:t>
+              <a:t>10/16/2017</a:t>
             </a:fld>
             <a:endParaRPr lang="en-US" dirty="0"/>
           </a:p>
@@ -1406,7 +1408,7 @@
             <a:fld id="{B61BEF0D-F0BB-DE4B-95CE-6DB70DBA9567}" type="datetimeFigureOut">
               <a:rPr lang="en-US" dirty="0"/>
               <a:pPr/>
-              <a:t>10/11/2017</a:t>
+              <a:t>10/16/2017</a:t>
             </a:fld>
             <a:endParaRPr lang="en-US" dirty="0"/>
           </a:p>
@@ -1705,7 +1707,7 @@
             <a:fld id="{B61BEF0D-F0BB-DE4B-95CE-6DB70DBA9567}" type="datetimeFigureOut">
               <a:rPr lang="en-US" dirty="0"/>
               <a:pPr/>
-              <a:t>10/11/2017</a:t>
+              <a:t>10/16/2017</a:t>
             </a:fld>
             <a:endParaRPr lang="en-US" dirty="0"/>
           </a:p>
@@ -2124,7 +2126,7 @@
             <a:fld id="{B61BEF0D-F0BB-DE4B-95CE-6DB70DBA9567}" type="datetimeFigureOut">
               <a:rPr lang="en-US" dirty="0"/>
               <a:pPr/>
-              <a:t>10/11/2017</a:t>
+              <a:t>10/16/2017</a:t>
             </a:fld>
             <a:endParaRPr lang="en-US" dirty="0"/>
           </a:p>
@@ -2283,7 +2285,7 @@
             <a:fld id="{B61BEF0D-F0BB-DE4B-95CE-6DB70DBA9567}" type="datetimeFigureOut">
               <a:rPr lang="en-US" dirty="0"/>
               <a:pPr/>
-              <a:t>10/11/2017</a:t>
+              <a:t>10/16/2017</a:t>
             </a:fld>
             <a:endParaRPr lang="en-US" dirty="0"/>
           </a:p>
@@ -2375,7 +2377,7 @@
             <a:fld id="{B61BEF0D-F0BB-DE4B-95CE-6DB70DBA9567}" type="datetimeFigureOut">
               <a:rPr lang="en-US" dirty="0"/>
               <a:pPr/>
-              <a:t>10/11/2017</a:t>
+              <a:t>10/16/2017</a:t>
             </a:fld>
             <a:endParaRPr lang="en-US" dirty="0"/>
           </a:p>
@@ -2750,7 +2752,7 @@
             <a:fld id="{B61BEF0D-F0BB-DE4B-95CE-6DB70DBA9567}" type="datetimeFigureOut">
               <a:rPr lang="en-US" dirty="0"/>
               <a:pPr/>
-              <a:t>10/11/2017</a:t>
+              <a:t>10/16/2017</a:t>
             </a:fld>
             <a:endParaRPr lang="en-US" dirty="0"/>
           </a:p>
@@ -3036,7 +3038,7 @@
             <a:fld id="{B61BEF0D-F0BB-DE4B-95CE-6DB70DBA9567}" type="datetimeFigureOut">
               <a:rPr lang="en-US" dirty="0"/>
               <a:pPr/>
-              <a:t>10/11/2017</a:t>
+              <a:t>10/16/2017</a:t>
             </a:fld>
             <a:endParaRPr lang="en-US" dirty="0"/>
           </a:p>
@@ -3244,7 +3246,7 @@
             <a:fld id="{B61BEF0D-F0BB-DE4B-95CE-6DB70DBA9567}" type="datetimeFigureOut">
               <a:rPr lang="en-US" dirty="0"/>
               <a:pPr/>
-              <a:t>10/11/2017</a:t>
+              <a:t>10/16/2017</a:t>
             </a:fld>
             <a:endParaRPr lang="en-US" dirty="0"/>
           </a:p>
@@ -3882,8 +3884,12 @@
           <a:p>
             <a:pPr algn="ctr"/>
             <a:r>
+              <a:rPr lang="en-US" dirty="0" smtClean="0"/>
+              <a:t>24</a:t>
+            </a:r>
+            <a:r>
               <a:rPr lang="el-GR" dirty="0" smtClean="0"/>
-              <a:t>Ταδε οκτωβρη – μητσελοσ αθανασιοσ</a:t>
+              <a:t> οκτωβρΙου – μητσελοσ αθανασιοσ</a:t>
             </a:r>
             <a:endParaRPr lang="el-GR" dirty="0"/>
           </a:p>
@@ -3899,6 +3905,13 @@
   <p:clrMapOvr>
     <a:masterClrMapping/>
   </p:clrMapOvr>
+  <p:timing>
+    <p:tnLst>
+      <p:par>
+        <p:cTn id="1" dur="indefinite" restart="never" nodeType="tmRoot"/>
+      </p:par>
+    </p:tnLst>
+  </p:timing>
 </p:sld>
 </file>
 
@@ -4177,8 +4190,8 @@
         </p:blipFill>
         <p:spPr>
           <a:xfrm>
-            <a:off x="5974292" y="1868030"/>
-            <a:ext cx="5524735" cy="4458154"/>
+            <a:off x="6269969" y="1906973"/>
+            <a:ext cx="4969868" cy="3692714"/>
           </a:xfrm>
           <a:prstGeom prst="rect">
             <a:avLst/>
@@ -4195,7 +4208,7 @@
         </p:nvSpPr>
         <p:spPr>
           <a:xfrm>
-            <a:off x="5974292" y="6081104"/>
+            <a:off x="241166" y="6343221"/>
             <a:ext cx="5961370" cy="436258"/>
           </a:xfrm>
           <a:prstGeom prst="rect">
@@ -4418,6 +4431,250 @@
           </a:p>
         </p:txBody>
       </p:sp>
+      <p:sp>
+        <p:nvSpPr>
+          <p:cNvPr id="10" name="Content Placeholder 4"/>
+          <p:cNvSpPr txBox="1">
+            <a:spLocks/>
+          </p:cNvSpPr>
+          <p:nvPr/>
+        </p:nvSpPr>
+        <p:spPr>
+          <a:xfrm>
+            <a:off x="6886322" y="5591907"/>
+            <a:ext cx="3892269" cy="1179791"/>
+          </a:xfrm>
+          <a:prstGeom prst="rect">
+            <a:avLst/>
+          </a:prstGeom>
+        </p:spPr>
+        <p:txBody>
+          <a:bodyPr vert="horz" lIns="91440" tIns="45720" rIns="91440" bIns="45720" rtlCol="0" anchor="ctr">
+            <a:normAutofit fontScale="85000" lnSpcReduction="20000"/>
+          </a:bodyPr>
+          <a:lstStyle>
+            <a:lvl1pPr marL="306000" indent="-306000" algn="l" defTabSz="457200" rtl="0" eaLnBrk="1" latinLnBrk="0" hangingPunct="1">
+              <a:spcBef>
+                <a:spcPct val="20000"/>
+              </a:spcBef>
+              <a:spcAft>
+                <a:spcPts val="600"/>
+              </a:spcAft>
+              <a:buClr>
+                <a:schemeClr val="accent2"/>
+              </a:buClr>
+              <a:buSzPct val="92000"/>
+              <a:buFont typeface="Wingdings 2" panose="05020102010507070707" pitchFamily="18" charset="2"/>
+              <a:buChar char=""/>
+              <a:defRPr sz="1800" kern="1200">
+                <a:solidFill>
+                  <a:schemeClr val="tx2"/>
+                </a:solidFill>
+                <a:latin typeface="+mn-lt"/>
+                <a:ea typeface="+mn-ea"/>
+                <a:cs typeface="+mn-cs"/>
+              </a:defRPr>
+            </a:lvl1pPr>
+            <a:lvl2pPr marL="630000" indent="-306000" algn="l" defTabSz="457200" rtl="0" eaLnBrk="1" latinLnBrk="0" hangingPunct="1">
+              <a:spcBef>
+                <a:spcPct val="20000"/>
+              </a:spcBef>
+              <a:spcAft>
+                <a:spcPts val="600"/>
+              </a:spcAft>
+              <a:buClr>
+                <a:schemeClr val="accent2"/>
+              </a:buClr>
+              <a:buSzPct val="92000"/>
+              <a:buFont typeface="Wingdings 2" panose="05020102010507070707" pitchFamily="18" charset="2"/>
+              <a:buChar char=""/>
+              <a:defRPr sz="1600" kern="1200">
+                <a:solidFill>
+                  <a:schemeClr val="tx2"/>
+                </a:solidFill>
+                <a:latin typeface="+mn-lt"/>
+                <a:ea typeface="+mn-ea"/>
+                <a:cs typeface="+mn-cs"/>
+              </a:defRPr>
+            </a:lvl2pPr>
+            <a:lvl3pPr marL="900000" indent="-270000" algn="l" defTabSz="457200" rtl="0" eaLnBrk="1" latinLnBrk="0" hangingPunct="1">
+              <a:spcBef>
+                <a:spcPct val="20000"/>
+              </a:spcBef>
+              <a:spcAft>
+                <a:spcPts val="600"/>
+              </a:spcAft>
+              <a:buClr>
+                <a:schemeClr val="accent2"/>
+              </a:buClr>
+              <a:buSzPct val="92000"/>
+              <a:buFont typeface="Wingdings 2" panose="05020102010507070707" pitchFamily="18" charset="2"/>
+              <a:buChar char=""/>
+              <a:defRPr sz="1400" kern="1200">
+                <a:solidFill>
+                  <a:schemeClr val="tx2"/>
+                </a:solidFill>
+                <a:latin typeface="+mn-lt"/>
+                <a:ea typeface="+mn-ea"/>
+                <a:cs typeface="+mn-cs"/>
+              </a:defRPr>
+            </a:lvl3pPr>
+            <a:lvl4pPr marL="1242000" indent="-234000" algn="l" defTabSz="457200" rtl="0" eaLnBrk="1" latinLnBrk="0" hangingPunct="1">
+              <a:spcBef>
+                <a:spcPct val="20000"/>
+              </a:spcBef>
+              <a:spcAft>
+                <a:spcPts val="600"/>
+              </a:spcAft>
+              <a:buClr>
+                <a:schemeClr val="accent2"/>
+              </a:buClr>
+              <a:buSzPct val="92000"/>
+              <a:buFont typeface="Wingdings 2" panose="05020102010507070707" pitchFamily="18" charset="2"/>
+              <a:buChar char=""/>
+              <a:defRPr sz="1200" kern="1200">
+                <a:solidFill>
+                  <a:schemeClr val="tx2"/>
+                </a:solidFill>
+                <a:latin typeface="+mn-lt"/>
+                <a:ea typeface="+mn-ea"/>
+                <a:cs typeface="+mn-cs"/>
+              </a:defRPr>
+            </a:lvl4pPr>
+            <a:lvl5pPr marL="1602000" indent="-234000" algn="l" defTabSz="457200" rtl="0" eaLnBrk="1" latinLnBrk="0" hangingPunct="1">
+              <a:spcBef>
+                <a:spcPct val="20000"/>
+              </a:spcBef>
+              <a:spcAft>
+                <a:spcPts val="600"/>
+              </a:spcAft>
+              <a:buClr>
+                <a:schemeClr val="accent2"/>
+              </a:buClr>
+              <a:buSzPct val="92000"/>
+              <a:buFont typeface="Wingdings 2" panose="05020102010507070707" pitchFamily="18" charset="2"/>
+              <a:buChar char=""/>
+              <a:defRPr sz="1200" kern="1200">
+                <a:solidFill>
+                  <a:schemeClr val="tx2"/>
+                </a:solidFill>
+                <a:latin typeface="+mn-lt"/>
+                <a:ea typeface="+mn-ea"/>
+                <a:cs typeface="+mn-cs"/>
+              </a:defRPr>
+            </a:lvl5pPr>
+            <a:lvl6pPr marL="1900000" indent="-228600" algn="l" defTabSz="457200" rtl="0" eaLnBrk="1" latinLnBrk="0" hangingPunct="1">
+              <a:spcBef>
+                <a:spcPct val="20000"/>
+              </a:spcBef>
+              <a:spcAft>
+                <a:spcPts val="600"/>
+              </a:spcAft>
+              <a:buClr>
+                <a:schemeClr val="accent2"/>
+              </a:buClr>
+              <a:buSzPct val="92000"/>
+              <a:buFont typeface="Wingdings 2" panose="05020102010507070707" pitchFamily="18" charset="2"/>
+              <a:buChar char=""/>
+              <a:defRPr sz="1200" kern="1200">
+                <a:solidFill>
+                  <a:schemeClr val="tx2"/>
+                </a:solidFill>
+                <a:latin typeface="+mn-lt"/>
+                <a:ea typeface="+mn-ea"/>
+                <a:cs typeface="+mn-cs"/>
+              </a:defRPr>
+            </a:lvl6pPr>
+            <a:lvl7pPr marL="2200000" indent="-228600" algn="l" defTabSz="457200" rtl="0" eaLnBrk="1" latinLnBrk="0" hangingPunct="1">
+              <a:spcBef>
+                <a:spcPct val="20000"/>
+              </a:spcBef>
+              <a:spcAft>
+                <a:spcPts val="600"/>
+              </a:spcAft>
+              <a:buClr>
+                <a:schemeClr val="accent2"/>
+              </a:buClr>
+              <a:buSzPct val="92000"/>
+              <a:buFont typeface="Wingdings 2" panose="05020102010507070707" pitchFamily="18" charset="2"/>
+              <a:buChar char=""/>
+              <a:defRPr sz="1200" kern="1200">
+                <a:solidFill>
+                  <a:schemeClr val="tx2"/>
+                </a:solidFill>
+                <a:latin typeface="+mn-lt"/>
+                <a:ea typeface="+mn-ea"/>
+                <a:cs typeface="+mn-cs"/>
+              </a:defRPr>
+            </a:lvl7pPr>
+            <a:lvl8pPr marL="2500000" indent="-228600" algn="l" defTabSz="457200" rtl="0" eaLnBrk="1" latinLnBrk="0" hangingPunct="1">
+              <a:spcBef>
+                <a:spcPct val="20000"/>
+              </a:spcBef>
+              <a:spcAft>
+                <a:spcPts val="600"/>
+              </a:spcAft>
+              <a:buClr>
+                <a:schemeClr val="accent2"/>
+              </a:buClr>
+              <a:buSzPct val="92000"/>
+              <a:buFont typeface="Wingdings 2" panose="05020102010507070707" pitchFamily="18" charset="2"/>
+              <a:buChar char=""/>
+              <a:defRPr sz="1200" kern="1200">
+                <a:solidFill>
+                  <a:schemeClr val="tx2"/>
+                </a:solidFill>
+                <a:latin typeface="+mn-lt"/>
+                <a:ea typeface="+mn-ea"/>
+                <a:cs typeface="+mn-cs"/>
+              </a:defRPr>
+            </a:lvl8pPr>
+            <a:lvl9pPr marL="2800000" indent="-228600" algn="l" defTabSz="457200" rtl="0" eaLnBrk="1" latinLnBrk="0" hangingPunct="1">
+              <a:spcBef>
+                <a:spcPct val="20000"/>
+              </a:spcBef>
+              <a:spcAft>
+                <a:spcPts val="600"/>
+              </a:spcAft>
+              <a:buClr>
+                <a:schemeClr val="accent2"/>
+              </a:buClr>
+              <a:buSzPct val="92000"/>
+              <a:buFont typeface="Wingdings 2" panose="05020102010507070707" pitchFamily="18" charset="2"/>
+              <a:buChar char=""/>
+              <a:defRPr sz="1200" kern="1200">
+                <a:solidFill>
+                  <a:schemeClr val="tx2"/>
+                </a:solidFill>
+                <a:latin typeface="+mn-lt"/>
+                <a:ea typeface="+mn-ea"/>
+                <a:cs typeface="+mn-cs"/>
+              </a:defRPr>
+            </a:lvl9pPr>
+          </a:lstStyle>
+          <a:p>
+            <a:pPr marL="0" indent="0">
+              <a:buNone/>
+            </a:pPr>
+            <a:r>
+              <a:rPr lang="el-GR" sz="2000" dirty="0" smtClean="0"/>
+              <a:t>Λεπτομέρειες δοκιμής</a:t>
+            </a:r>
+          </a:p>
+          <a:p>
+            <a:r>
+              <a:rPr lang="el-GR" sz="2000" dirty="0" smtClean="0"/>
+              <a:t>2.000 καταναλωτές</a:t>
+            </a:r>
+          </a:p>
+          <a:p>
+            <a:r>
+              <a:rPr lang="el-GR" sz="2000" dirty="0" smtClean="0"/>
+              <a:t>50% καταναλωτών με μη τεχνικές απώλειες</a:t>
+            </a:r>
+          </a:p>
+        </p:txBody>
+      </p:sp>
     </p:spTree>
     <p:extLst>
       <p:ext uri="{BB962C8B-B14F-4D97-AF65-F5344CB8AC3E}">
@@ -4428,6 +4685,13 @@
   <p:clrMapOvr>
     <a:masterClrMapping/>
   </p:clrMapOvr>
+  <p:timing>
+    <p:tnLst>
+      <p:par>
+        <p:cTn id="1" dur="indefinite" restart="never" nodeType="tmRoot"/>
+      </p:par>
+    </p:tnLst>
+  </p:timing>
 </p:sld>
 </file>
 
@@ -4496,7 +4760,7 @@
         </p:blipFill>
         <p:spPr>
           <a:xfrm>
-            <a:off x="947903" y="2227263"/>
+            <a:off x="936748" y="2460403"/>
             <a:ext cx="4689143" cy="3633787"/>
           </a:xfrm>
         </p:spPr>
@@ -4599,6 +4863,45 @@
           </a:p>
         </p:txBody>
       </p:sp>
+      <p:sp>
+        <p:nvSpPr>
+          <p:cNvPr id="7" name="Rounded Rectangle 6"/>
+          <p:cNvSpPr/>
+          <p:nvPr/>
+        </p:nvSpPr>
+        <p:spPr>
+          <a:xfrm>
+            <a:off x="809203" y="2008137"/>
+            <a:ext cx="4944234" cy="4538320"/>
+          </a:xfrm>
+          <a:prstGeom prst="roundRect">
+            <a:avLst/>
+          </a:prstGeom>
+          <a:noFill/>
+        </p:spPr>
+        <p:style>
+          <a:lnRef idx="2">
+            <a:schemeClr val="accent2"/>
+          </a:lnRef>
+          <a:fillRef idx="1">
+            <a:schemeClr val="lt1"/>
+          </a:fillRef>
+          <a:effectRef idx="0">
+            <a:schemeClr val="accent2"/>
+          </a:effectRef>
+          <a:fontRef idx="minor">
+            <a:schemeClr val="dk1"/>
+          </a:fontRef>
+        </p:style>
+        <p:txBody>
+          <a:bodyPr rtlCol="0" anchor="ctr"/>
+          <a:lstStyle/>
+          <a:p>
+            <a:pPr algn="ctr"/>
+            <a:endParaRPr lang="el-GR"/>
+          </a:p>
+        </p:txBody>
+      </p:sp>
     </p:spTree>
     <p:extLst>
       <p:ext uri="{BB962C8B-B14F-4D97-AF65-F5344CB8AC3E}">
@@ -4609,6 +4912,13 @@
   <p:clrMapOvr>
     <a:masterClrMapping/>
   </p:clrMapOvr>
+  <p:timing>
+    <p:tnLst>
+      <p:par>
+        <p:cTn id="1" dur="indefinite" restart="never" nodeType="tmRoot"/>
+      </p:par>
+    </p:tnLst>
+  </p:timing>
 </p:sld>
 </file>
 
@@ -4677,7 +4987,7 @@
         </p:blipFill>
         <p:spPr>
           <a:xfrm>
-            <a:off x="812980" y="1878819"/>
+            <a:off x="681707" y="1887487"/>
             <a:ext cx="3345511" cy="2509133"/>
           </a:xfrm>
         </p:spPr>
@@ -4706,7 +5016,7 @@
         </p:blipFill>
         <p:spPr>
           <a:xfrm>
-            <a:off x="811209" y="4364872"/>
+            <a:off x="681707" y="4265379"/>
             <a:ext cx="3347282" cy="2510462"/>
           </a:xfrm>
         </p:spPr>
@@ -4721,8 +5031,8 @@
         </p:nvSpPr>
         <p:spPr>
           <a:xfrm>
-            <a:off x="4384966" y="4347538"/>
-            <a:ext cx="3724842" cy="2428303"/>
+            <a:off x="4384966" y="5025154"/>
+            <a:ext cx="3724842" cy="1750687"/>
           </a:xfrm>
           <a:prstGeom prst="rect">
             <a:avLst/>
@@ -4730,7 +5040,7 @@
         </p:spPr>
         <p:txBody>
           <a:bodyPr vert="horz" lIns="91440" tIns="45720" rIns="91440" bIns="45720" rtlCol="0" anchor="ctr">
-            <a:normAutofit/>
+            <a:normAutofit fontScale="70000" lnSpcReduction="20000"/>
           </a:bodyPr>
           <a:lstStyle>
             <a:lvl1pPr marL="306000" indent="-306000" algn="l" defTabSz="457200" rtl="0" eaLnBrk="1" latinLnBrk="0" hangingPunct="1">
@@ -4945,6 +5255,13 @@
             <a:r>
               <a:rPr lang="el-GR" sz="2000" dirty="0" smtClean="0"/>
               <a:t>4.500 καταναλωτές</a:t>
+            </a:r>
+            <a:endParaRPr lang="en-US" sz="2000" dirty="0" smtClean="0"/>
+          </a:p>
+          <a:p>
+            <a:r>
+              <a:rPr lang="el-GR" sz="2000" dirty="0" smtClean="0"/>
+              <a:t>8 χαρακτηριστικά κάθε καταναλωτής</a:t>
             </a:r>
           </a:p>
           <a:p>
@@ -4973,7 +5290,7 @@
         <p:spPr>
           <a:xfrm>
             <a:off x="4384966" y="1919235"/>
-            <a:ext cx="7008707" cy="2428303"/>
+            <a:ext cx="7008707" cy="3105919"/>
           </a:xfrm>
           <a:prstGeom prst="rect">
             <a:avLst/>
@@ -4981,7 +5298,7 @@
         </p:spPr>
         <p:txBody>
           <a:bodyPr vert="horz" lIns="91440" tIns="45720" rIns="91440" bIns="45720" rtlCol="0" anchor="ctr">
-            <a:normAutofit lnSpcReduction="10000"/>
+            <a:normAutofit/>
           </a:bodyPr>
           <a:lstStyle>
             <a:lvl1pPr marL="306000" indent="-306000" algn="l" defTabSz="457200" rtl="0" eaLnBrk="1" latinLnBrk="0" hangingPunct="1">
@@ -5197,6 +5514,7 @@
               <a:rPr lang="el-GR" sz="2000" dirty="0" smtClean="0"/>
               <a:t>Έντονες μεταβολές μέχρι 50% έντασης κλοπής</a:t>
             </a:r>
+            <a:endParaRPr lang="en-US" sz="2000" dirty="0" smtClean="0"/>
           </a:p>
           <a:p>
             <a:r>
@@ -5237,6 +5555,16 @@
           </a:p>
           <a:p>
             <a:r>
+              <a:rPr lang="el-GR" sz="2000" dirty="0"/>
+              <a:t>Προσανατολισμός συστήματος σε απάτες υψηλής </a:t>
+            </a:r>
+            <a:r>
+              <a:rPr lang="el-GR" sz="2000" dirty="0" smtClean="0"/>
+              <a:t>έντασης</a:t>
+            </a:r>
+          </a:p>
+          <a:p>
+            <a:r>
               <a:rPr lang="el-GR" sz="2000" dirty="0" smtClean="0"/>
               <a:t>Υψηλό </a:t>
             </a:r>
@@ -5255,6 +5583,45 @@
               <a:t>με περιθώρια βελτίωσης</a:t>
             </a:r>
             <a:endParaRPr lang="el-GR" sz="2000" dirty="0"/>
+          </a:p>
+        </p:txBody>
+      </p:sp>
+      <p:sp>
+        <p:nvSpPr>
+          <p:cNvPr id="7" name="Rectangle 6"/>
+          <p:cNvSpPr/>
+          <p:nvPr/>
+        </p:nvSpPr>
+        <p:spPr>
+          <a:xfrm>
+            <a:off x="581193" y="1919235"/>
+            <a:ext cx="3546540" cy="4856606"/>
+          </a:xfrm>
+          <a:prstGeom prst="rect">
+            <a:avLst/>
+          </a:prstGeom>
+          <a:noFill/>
+        </p:spPr>
+        <p:style>
+          <a:lnRef idx="2">
+            <a:schemeClr val="accent2"/>
+          </a:lnRef>
+          <a:fillRef idx="1">
+            <a:schemeClr val="lt1"/>
+          </a:fillRef>
+          <a:effectRef idx="0">
+            <a:schemeClr val="accent2"/>
+          </a:effectRef>
+          <a:fontRef idx="minor">
+            <a:schemeClr val="dk1"/>
+          </a:fontRef>
+        </p:style>
+        <p:txBody>
+          <a:bodyPr rtlCol="0" anchor="ctr"/>
+          <a:lstStyle/>
+          <a:p>
+            <a:pPr algn="ctr"/>
+            <a:endParaRPr lang="el-GR"/>
           </a:p>
         </p:txBody>
       </p:sp>
@@ -5268,6 +5635,13 @@
   <p:clrMapOvr>
     <a:masterClrMapping/>
   </p:clrMapOvr>
+  <p:timing>
+    <p:tnLst>
+      <p:par>
+        <p:cTn id="1" dur="indefinite" restart="never" nodeType="tmRoot"/>
+      </p:par>
+    </p:tnLst>
+  </p:timing>
 </p:sld>
 </file>
 
@@ -5336,7 +5710,7 @@
         </p:blipFill>
         <p:spPr>
           <a:xfrm>
-            <a:off x="1132885" y="1934273"/>
+            <a:off x="1132884" y="2031284"/>
             <a:ext cx="4207859" cy="4557912"/>
           </a:xfrm>
         </p:spPr>
@@ -5908,6 +6282,45 @@
           </a:p>
         </p:txBody>
       </p:sp>
+      <p:sp>
+        <p:nvSpPr>
+          <p:cNvPr id="9" name="Rounded Rectangle 8"/>
+          <p:cNvSpPr/>
+          <p:nvPr/>
+        </p:nvSpPr>
+        <p:spPr>
+          <a:xfrm>
+            <a:off x="764696" y="1909078"/>
+            <a:ext cx="4944234" cy="4802324"/>
+          </a:xfrm>
+          <a:prstGeom prst="roundRect">
+            <a:avLst/>
+          </a:prstGeom>
+          <a:noFill/>
+        </p:spPr>
+        <p:style>
+          <a:lnRef idx="2">
+            <a:schemeClr val="accent2"/>
+          </a:lnRef>
+          <a:fillRef idx="1">
+            <a:schemeClr val="lt1"/>
+          </a:fillRef>
+          <a:effectRef idx="0">
+            <a:schemeClr val="accent2"/>
+          </a:effectRef>
+          <a:fontRef idx="minor">
+            <a:schemeClr val="dk1"/>
+          </a:fontRef>
+        </p:style>
+        <p:txBody>
+          <a:bodyPr rtlCol="0" anchor="ctr"/>
+          <a:lstStyle/>
+          <a:p>
+            <a:pPr algn="ctr"/>
+            <a:endParaRPr lang="el-GR"/>
+          </a:p>
+        </p:txBody>
+      </p:sp>
     </p:spTree>
     <p:extLst>
       <p:ext uri="{BB962C8B-B14F-4D97-AF65-F5344CB8AC3E}">
@@ -5918,6 +6331,13 @@
   <p:clrMapOvr>
     <a:masterClrMapping/>
   </p:clrMapOvr>
+  <p:timing>
+    <p:tnLst>
+      <p:par>
+        <p:cTn id="1" dur="indefinite" restart="never" nodeType="tmRoot"/>
+      </p:par>
+    </p:tnLst>
+  </p:timing>
 </p:sld>
 </file>
 
@@ -6379,6 +6799,13 @@
   <p:clrMapOvr>
     <a:masterClrMapping/>
   </p:clrMapOvr>
+  <p:timing>
+    <p:tnLst>
+      <p:par>
+        <p:cTn id="1" dur="indefinite" restart="never" nodeType="tmRoot"/>
+      </p:par>
+    </p:tnLst>
+  </p:timing>
 </p:sld>
 </file>
 
@@ -6477,8 +6904,13 @@
             </a:pPr>
             <a:r>
               <a:rPr lang="el-GR" dirty="0" smtClean="0"/>
-              <a:t>Βήματα ταξινόμησης με ανίχνευση ανωμαλιών</a:t>
-            </a:r>
+              <a:t>Βήματα ταξινόμησης με ανίχνευση </a:t>
+            </a:r>
+            <a:r>
+              <a:rPr lang="el-GR" dirty="0" smtClean="0"/>
+              <a:t>ανωμαλιών:</a:t>
+            </a:r>
+            <a:endParaRPr lang="el-GR" dirty="0" smtClean="0"/>
           </a:p>
           <a:p>
             <a:pPr marL="342900" indent="-342900">
@@ -6487,8 +6919,13 @@
             </a:pPr>
             <a:r>
               <a:rPr lang="el-GR" dirty="0" smtClean="0"/>
-              <a:t>70% καταναλωτών εξάγει στατιστικά μεγέθη </a:t>
-            </a:r>
+              <a:t>Με 70% των καταναλωτών εξάγωνται διανύσματα μέσου όρου και </a:t>
+            </a:r>
+            <a:r>
+              <a:rPr lang="el-GR" dirty="0" smtClean="0"/>
+              <a:t>διακύμανσης.</a:t>
+            </a:r>
+            <a:endParaRPr lang="el-GR" dirty="0" smtClean="0"/>
           </a:p>
           <a:p>
             <a:pPr marL="342900" indent="-342900">
@@ -6497,8 +6934,21 @@
             </a:pPr>
             <a:r>
               <a:rPr lang="el-GR" dirty="0" smtClean="0"/>
-              <a:t>30% καταναλωτών βελτιστοποιεί το όριο διαχωρισμού</a:t>
-            </a:r>
+              <a:t>Με 30%  των καταναλωτών βελτιστοποιείται το όριο διαχωρισμού βάσει βέλτισου </a:t>
+            </a:r>
+            <a:r>
+              <a:rPr lang="en-US" dirty="0" smtClean="0"/>
+              <a:t>F1 </a:t>
+            </a:r>
+            <a:r>
+              <a:rPr lang="en-US" dirty="0" smtClean="0"/>
+              <a:t>score</a:t>
+            </a:r>
+            <a:r>
+              <a:rPr lang="el-GR" dirty="0" smtClean="0"/>
+              <a:t>.</a:t>
+            </a:r>
+            <a:endParaRPr lang="el-GR" dirty="0" smtClean="0"/>
           </a:p>
           <a:p>
             <a:pPr marL="342900" indent="-342900">
@@ -6507,8 +6957,13 @@
             </a:pPr>
             <a:r>
               <a:rPr lang="el-GR" dirty="0" smtClean="0"/>
-              <a:t>70%  καταναλωτών ταξινομείται βάσει του ορίου διαχωρισμού</a:t>
-            </a:r>
+              <a:t>Ταξινόμηση του 70% των καταναλωτών βάσει του βέλτιστου ορίου </a:t>
+            </a:r>
+            <a:r>
+              <a:rPr lang="el-GR" dirty="0" smtClean="0"/>
+              <a:t>διαχωρισμού.</a:t>
+            </a:r>
+            <a:endParaRPr lang="el-GR" dirty="0" smtClean="0"/>
           </a:p>
           <a:p>
             <a:endParaRPr lang="el-GR" dirty="0" smtClean="0"/>
@@ -6537,7 +6992,7 @@
         </p:spPr>
         <p:txBody>
           <a:bodyPr vert="horz" lIns="91440" tIns="45720" rIns="91440" bIns="45720" rtlCol="0" anchor="ctr">
-            <a:normAutofit fontScale="92500" lnSpcReduction="10000"/>
+            <a:normAutofit/>
           </a:bodyPr>
           <a:lstStyle>
             <a:lvl1pPr marL="306000" indent="-306000" algn="l" defTabSz="457200" rtl="0" eaLnBrk="1" latinLnBrk="0" hangingPunct="1">
@@ -6748,31 +7203,12 @@
           <a:p>
             <a:r>
               <a:rPr lang="el-GR" dirty="0" smtClean="0"/>
-              <a:t>Διαχωρίζει όλους τους καταναλωτές με ιδιαίτερες ανάγκες</a:t>
-            </a:r>
-          </a:p>
-          <a:p>
-            <a:pPr lvl="1"/>
+              <a:t>Διαχωρι</a:t>
+            </a:r>
             <a:r>
               <a:rPr lang="el-GR" dirty="0" smtClean="0"/>
-              <a:t>Μικρομεσσαίες επιχειρήσεις</a:t>
-            </a:r>
-          </a:p>
-          <a:p>
-            <a:pPr lvl="1"/>
-            <a:r>
-              <a:rPr lang="el-GR" dirty="0" smtClean="0"/>
-              <a:t>Καταναλωτές με ιδιαίτερες συνήθειες</a:t>
-            </a:r>
-          </a:p>
-          <a:p>
-            <a:pPr lvl="1"/>
-            <a:r>
-              <a:rPr lang="el-GR" dirty="0" smtClean="0"/>
-              <a:t>Ρευματοκλοπές</a:t>
-            </a:r>
-          </a:p>
-          <a:p>
+              <a:t>σμός των τυπικών καταναλωτών από τους καταναλωτές με ιδιαίτερες ενεργειακές ανάγκες</a:t>
+            </a:r>
             <a:endParaRPr lang="el-GR" dirty="0" smtClean="0"/>
           </a:p>
         </p:txBody>
@@ -6787,6 +7223,13 @@
   <p:clrMapOvr>
     <a:masterClrMapping/>
   </p:clrMapOvr>
+  <p:timing>
+    <p:tnLst>
+      <p:par>
+        <p:cTn id="1" dur="indefinite" restart="never" nodeType="tmRoot"/>
+      </p:par>
+    </p:tnLst>
+  </p:timing>
 </p:sld>
 </file>
 
@@ -6855,7 +7298,7 @@
         </p:blipFill>
         <p:spPr>
           <a:xfrm>
-            <a:off x="975061" y="1890159"/>
+            <a:off x="691973" y="1919235"/>
             <a:ext cx="3324980" cy="2493735"/>
           </a:xfrm>
         </p:spPr>
@@ -6884,14 +7327,14 @@
         </p:blipFill>
         <p:spPr>
           <a:xfrm>
-            <a:off x="975061" y="4383894"/>
+            <a:off x="691973" y="4301735"/>
             <a:ext cx="3298808" cy="2474106"/>
           </a:xfrm>
         </p:spPr>
       </p:pic>
       <p:sp>
         <p:nvSpPr>
-          <p:cNvPr id="7" name="Content Placeholder 4"/>
+          <p:cNvPr id="8" name="Content Placeholder 4"/>
           <p:cNvSpPr txBox="1">
             <a:spLocks/>
           </p:cNvSpPr>
@@ -6899,8 +7342,8 @@
         </p:nvSpPr>
         <p:spPr>
           <a:xfrm>
-            <a:off x="4300041" y="4556063"/>
-            <a:ext cx="3826441" cy="2256134"/>
+            <a:off x="4300041" y="2008958"/>
+            <a:ext cx="7310768" cy="3016195"/>
           </a:xfrm>
           <a:prstGeom prst="rect">
             <a:avLst/>
@@ -7116,25 +7559,53 @@
             </a:pPr>
             <a:r>
               <a:rPr lang="el-GR" sz="2000" dirty="0" smtClean="0"/>
-              <a:t>Λεπτομέρειες δοκιμής</a:t>
+              <a:t>Παρατηρήσεις</a:t>
             </a:r>
           </a:p>
           <a:p>
             <a:r>
               <a:rPr lang="el-GR" sz="2000" dirty="0" smtClean="0"/>
-              <a:t>4.500 καταναλωτές</a:t>
-            </a:r>
-          </a:p>
-          <a:p>
+              <a:t>Ομαλές μεταβολές του </a:t>
+            </a:r>
+            <a:r>
+              <a:rPr lang="en-US" sz="2000" dirty="0" smtClean="0"/>
+              <a:t>DR </a:t>
+            </a:r>
             <a:r>
               <a:rPr lang="el-GR" sz="2000" dirty="0" smtClean="0"/>
-              <a:t>10% καταναλωτών με μη τεχνικές απώλειες</a:t>
-            </a:r>
+              <a:t>και </a:t>
+            </a:r>
+            <a:r>
+              <a:rPr lang="en-US" sz="2000" dirty="0" smtClean="0"/>
+              <a:t>FPR</a:t>
+            </a:r>
+            <a:endParaRPr lang="el-GR" sz="2000" dirty="0" smtClean="0"/>
           </a:p>
           <a:p>
             <a:r>
               <a:rPr lang="el-GR" sz="2000" dirty="0" smtClean="0"/>
-              <a:t>Απάτη τύπου 1</a:t>
+              <a:t>Σταθερά χαμηλό </a:t>
+            </a:r>
+            <a:r>
+              <a:rPr lang="en-US" sz="2000" dirty="0" smtClean="0"/>
+              <a:t>FPR</a:t>
+            </a:r>
+            <a:endParaRPr lang="el-GR" sz="2000" dirty="0" smtClean="0"/>
+          </a:p>
+          <a:p>
+            <a:r>
+              <a:rPr lang="el-GR" sz="2000" dirty="0" smtClean="0"/>
+              <a:t>Σχετικά χαμηλό </a:t>
+            </a:r>
+            <a:r>
+              <a:rPr lang="en-US" sz="2000" dirty="0" smtClean="0"/>
+              <a:t>DR</a:t>
+            </a:r>
+          </a:p>
+          <a:p>
+            <a:r>
+              <a:rPr lang="el-GR" sz="2000" dirty="0" smtClean="0"/>
+              <a:t>Ικανοποιητικά αποτελέσματα για πάνω από 60% ένταση κλοπής</a:t>
             </a:r>
             <a:endParaRPr lang="el-GR" sz="2000" dirty="0"/>
           </a:p>
@@ -7142,7 +7613,7 @@
       </p:sp>
       <p:sp>
         <p:nvSpPr>
-          <p:cNvPr id="8" name="Content Placeholder 4"/>
+          <p:cNvPr id="9" name="Content Placeholder 4"/>
           <p:cNvSpPr txBox="1">
             <a:spLocks/>
           </p:cNvSpPr>
@@ -7150,8 +7621,8 @@
         </p:nvSpPr>
         <p:spPr>
           <a:xfrm>
-            <a:off x="4300041" y="2008959"/>
-            <a:ext cx="7310768" cy="2256134"/>
+            <a:off x="4384966" y="5025154"/>
+            <a:ext cx="3724842" cy="1750687"/>
           </a:xfrm>
           <a:prstGeom prst="rect">
             <a:avLst/>
@@ -7159,7 +7630,7 @@
         </p:spPr>
         <p:txBody>
           <a:bodyPr vert="horz" lIns="91440" tIns="45720" rIns="91440" bIns="45720" rtlCol="0" anchor="ctr">
-            <a:normAutofit fontScale="92500"/>
+            <a:normAutofit fontScale="70000" lnSpcReduction="20000"/>
           </a:bodyPr>
           <a:lstStyle>
             <a:lvl1pPr marL="306000" indent="-306000" algn="l" defTabSz="457200" rtl="0" eaLnBrk="1" latinLnBrk="0" hangingPunct="1">
@@ -7367,55 +7838,73 @@
             </a:pPr>
             <a:r>
               <a:rPr lang="el-GR" sz="2000" dirty="0" smtClean="0"/>
-              <a:t>Παρατηρήσεις</a:t>
+              <a:t>Λεπτομέρειες δοκιμής</a:t>
             </a:r>
           </a:p>
           <a:p>
             <a:r>
               <a:rPr lang="el-GR" sz="2000" dirty="0" smtClean="0"/>
-              <a:t>Ομαλές μεταβολές του </a:t>
-            </a:r>
-            <a:r>
-              <a:rPr lang="en-US" sz="2000" dirty="0" smtClean="0"/>
-              <a:t>DR </a:t>
-            </a:r>
+              <a:t>4.500 καταναλωτές</a:t>
+            </a:r>
+            <a:endParaRPr lang="en-US" sz="2000" dirty="0" smtClean="0"/>
+          </a:p>
+          <a:p>
             <a:r>
               <a:rPr lang="el-GR" sz="2000" dirty="0" smtClean="0"/>
-              <a:t>και </a:t>
-            </a:r>
-            <a:r>
-              <a:rPr lang="en-US" sz="2000" dirty="0" smtClean="0"/>
-              <a:t>FPR</a:t>
-            </a:r>
-            <a:endParaRPr lang="el-GR" sz="2000" dirty="0" smtClean="0"/>
+              <a:t>8 χαρακτηριστικά κάθε καταναλωτής</a:t>
+            </a:r>
           </a:p>
           <a:p>
             <a:r>
               <a:rPr lang="el-GR" sz="2000" dirty="0" smtClean="0"/>
-              <a:t>Σταθερά χαμηλό </a:t>
-            </a:r>
-            <a:r>
-              <a:rPr lang="en-US" sz="2000" dirty="0" smtClean="0"/>
-              <a:t>FPR</a:t>
-            </a:r>
-            <a:endParaRPr lang="el-GR" sz="2000" dirty="0" smtClean="0"/>
+              <a:t>10% καταναλωτών με μη τεχνικές απώλειες</a:t>
+            </a:r>
           </a:p>
           <a:p>
             <a:r>
               <a:rPr lang="el-GR" sz="2000" dirty="0" smtClean="0"/>
-              <a:t>Σχετικά χαμηλό </a:t>
-            </a:r>
-            <a:r>
-              <a:rPr lang="en-US" sz="2000" dirty="0" smtClean="0"/>
-              <a:t>DR</a:t>
-            </a:r>
-          </a:p>
-          <a:p>
-            <a:r>
-              <a:rPr lang="el-GR" sz="2000" dirty="0" smtClean="0"/>
-              <a:t>Ικανοποιητικά αποτελέσματα για πάνω από 60% ένταση κλοπής</a:t>
+              <a:t>Απάτη τύπου 1</a:t>
             </a:r>
             <a:endParaRPr lang="el-GR" sz="2000" dirty="0"/>
+          </a:p>
+        </p:txBody>
+      </p:sp>
+      <p:sp>
+        <p:nvSpPr>
+          <p:cNvPr id="10" name="Rectangle 9"/>
+          <p:cNvSpPr/>
+          <p:nvPr/>
+        </p:nvSpPr>
+        <p:spPr>
+          <a:xfrm>
+            <a:off x="581193" y="1919235"/>
+            <a:ext cx="3546540" cy="4856606"/>
+          </a:xfrm>
+          <a:prstGeom prst="rect">
+            <a:avLst/>
+          </a:prstGeom>
+          <a:noFill/>
+        </p:spPr>
+        <p:style>
+          <a:lnRef idx="2">
+            <a:schemeClr val="accent2"/>
+          </a:lnRef>
+          <a:fillRef idx="1">
+            <a:schemeClr val="lt1"/>
+          </a:fillRef>
+          <a:effectRef idx="0">
+            <a:schemeClr val="accent2"/>
+          </a:effectRef>
+          <a:fontRef idx="minor">
+            <a:schemeClr val="dk1"/>
+          </a:fontRef>
+        </p:style>
+        <p:txBody>
+          <a:bodyPr rtlCol="0" anchor="ctr"/>
+          <a:lstStyle/>
+          <a:p>
+            <a:pPr algn="ctr"/>
+            <a:endParaRPr lang="el-GR"/>
           </a:p>
         </p:txBody>
       </p:sp>
@@ -7429,6 +7918,13 @@
   <p:clrMapOvr>
     <a:masterClrMapping/>
   </p:clrMapOvr>
+  <p:timing>
+    <p:tnLst>
+      <p:par>
+        <p:cTn id="1" dur="indefinite" restart="never" nodeType="tmRoot"/>
+      </p:par>
+    </p:tnLst>
+  </p:timing>
 </p:sld>
 </file>
 
@@ -7459,7 +7955,12 @@
             <p:ph type="title"/>
           </p:nvPr>
         </p:nvSpPr>
-        <p:spPr/>
+        <p:spPr>
+          <a:xfrm>
+            <a:off x="581193" y="486897"/>
+            <a:ext cx="11029616" cy="988332"/>
+          </a:xfrm>
+        </p:spPr>
         <p:txBody>
           <a:bodyPr/>
           <a:lstStyle/>
@@ -8027,6 +8528,308 @@
   <p:clrMapOvr>
     <a:masterClrMapping/>
   </p:clrMapOvr>
+  <p:timing>
+    <p:tnLst>
+      <p:par>
+        <p:cTn id="1" dur="indefinite" restart="never" nodeType="tmRoot"/>
+      </p:par>
+    </p:tnLst>
+  </p:timing>
+</p:sld>
+</file>
+
+<file path=ppt/slides/slide18.xml><?xml version="1.0" encoding="utf-8"?>
+<p:sld xmlns:a="http://schemas.openxmlformats.org/drawingml/2006/main" xmlns:r="http://schemas.openxmlformats.org/officeDocument/2006/relationships" xmlns:p="http://schemas.openxmlformats.org/presentationml/2006/main">
+  <p:cSld>
+    <p:spTree>
+      <p:nvGrpSpPr>
+        <p:cNvPr id="1" name=""/>
+        <p:cNvGrpSpPr/>
+        <p:nvPr/>
+      </p:nvGrpSpPr>
+      <p:grpSpPr>
+        <a:xfrm>
+          <a:off x="0" y="0"/>
+          <a:ext cx="0" cy="0"/>
+          <a:chOff x="0" y="0"/>
+          <a:chExt cx="0" cy="0"/>
+        </a:xfrm>
+      </p:grpSpPr>
+      <p:sp>
+        <p:nvSpPr>
+          <p:cNvPr id="5" name="Title 4"/>
+          <p:cNvSpPr>
+            <a:spLocks noGrp="1"/>
+          </p:cNvSpPr>
+          <p:nvPr>
+            <p:ph type="title"/>
+          </p:nvPr>
+        </p:nvSpPr>
+        <p:spPr>
+          <a:xfrm>
+            <a:off x="581194" y="839449"/>
+            <a:ext cx="11029616" cy="638698"/>
+          </a:xfrm>
+        </p:spPr>
+        <p:txBody>
+          <a:bodyPr/>
+          <a:lstStyle/>
+          <a:p>
+            <a:pPr algn="ctr"/>
+            <a:r>
+              <a:rPr lang="el-GR" dirty="0" smtClean="0"/>
+              <a:t>Συμπερασματα Και ΜελλοντικΗ επεκταση</a:t>
+            </a:r>
+            <a:endParaRPr lang="el-GR" dirty="0"/>
+          </a:p>
+        </p:txBody>
+      </p:sp>
+      <p:sp>
+        <p:nvSpPr>
+          <p:cNvPr id="9" name="Text Placeholder 8"/>
+          <p:cNvSpPr>
+            <a:spLocks noGrp="1"/>
+          </p:cNvSpPr>
+          <p:nvPr>
+            <p:ph type="body" idx="1"/>
+          </p:nvPr>
+        </p:nvSpPr>
+        <p:spPr>
+          <a:xfrm>
+            <a:off x="887219" y="2063470"/>
+            <a:ext cx="5087075" cy="723428"/>
+          </a:xfrm>
+        </p:spPr>
+        <p:txBody>
+          <a:bodyPr/>
+          <a:lstStyle/>
+          <a:p>
+            <a:pPr algn="ctr"/>
+            <a:r>
+              <a:rPr lang="el-GR" dirty="0"/>
+              <a:t>Αξιόπιστες τεχνικές για τον εντοπισμό  </a:t>
+            </a:r>
+            <a:r>
+              <a:rPr lang="el-GR" dirty="0" smtClean="0"/>
+              <a:t>ρευματοκλοπών</a:t>
+            </a:r>
+            <a:endParaRPr lang="el-GR" dirty="0"/>
+          </a:p>
+        </p:txBody>
+      </p:sp>
+      <p:sp>
+        <p:nvSpPr>
+          <p:cNvPr id="10" name="Content Placeholder 9"/>
+          <p:cNvSpPr>
+            <a:spLocks noGrp="1"/>
+          </p:cNvSpPr>
+          <p:nvPr>
+            <p:ph sz="half" idx="2"/>
+          </p:nvPr>
+        </p:nvSpPr>
+        <p:spPr/>
+        <p:txBody>
+          <a:bodyPr/>
+          <a:lstStyle/>
+          <a:p>
+            <a:r>
+              <a:rPr lang="el-GR" dirty="0" smtClean="0"/>
+              <a:t>Γραμμικοί ταξινόμηση χρονοσειρών</a:t>
+            </a:r>
+          </a:p>
+          <a:p>
+            <a:r>
+              <a:rPr lang="el-GR" dirty="0" smtClean="0"/>
+              <a:t>Κανονικοποίηση καταναλώσεων και συσταδοποίηση χρονοσειρών</a:t>
+            </a:r>
+          </a:p>
+          <a:p>
+            <a:r>
+              <a:rPr lang="el-GR" dirty="0" smtClean="0"/>
+              <a:t>Εξαγωγή χαρακτηριστικών και κανονικοποίηση</a:t>
+            </a:r>
+          </a:p>
+          <a:p>
+            <a:r>
+              <a:rPr lang="el-GR" dirty="0" smtClean="0"/>
+              <a:t>Ανίχνευση ανωμαλιών στα χαρακτηριστικά</a:t>
+            </a:r>
+          </a:p>
+          <a:p>
+            <a:r>
+              <a:rPr lang="el-GR" dirty="0" smtClean="0"/>
+              <a:t>Συνδυασμός αλγορίθμων και σύνθεση συστημάτων.</a:t>
+            </a:r>
+          </a:p>
+        </p:txBody>
+      </p:sp>
+      <p:sp>
+        <p:nvSpPr>
+          <p:cNvPr id="11" name="Text Placeholder 10"/>
+          <p:cNvSpPr>
+            <a:spLocks noGrp="1"/>
+          </p:cNvSpPr>
+          <p:nvPr>
+            <p:ph type="body" sz="quarter" idx="3"/>
+          </p:nvPr>
+        </p:nvSpPr>
+        <p:spPr>
+          <a:xfrm>
+            <a:off x="6523735" y="2063470"/>
+            <a:ext cx="5087073" cy="740795"/>
+          </a:xfrm>
+        </p:spPr>
+        <p:txBody>
+          <a:bodyPr/>
+          <a:lstStyle/>
+          <a:p>
+            <a:pPr algn="ctr"/>
+            <a:r>
+              <a:rPr lang="el-GR" dirty="0" smtClean="0"/>
+              <a:t>Μελλοντική κατεύθυνση αυτής της διπλωματικής</a:t>
+            </a:r>
+            <a:endParaRPr lang="el-GR" dirty="0"/>
+          </a:p>
+        </p:txBody>
+      </p:sp>
+      <p:sp>
+        <p:nvSpPr>
+          <p:cNvPr id="12" name="Content Placeholder 11"/>
+          <p:cNvSpPr>
+            <a:spLocks noGrp="1"/>
+          </p:cNvSpPr>
+          <p:nvPr>
+            <p:ph sz="quarter" idx="4"/>
+          </p:nvPr>
+        </p:nvSpPr>
+        <p:spPr>
+          <a:xfrm>
+            <a:off x="6217709" y="2926052"/>
+            <a:ext cx="5393100" cy="2934999"/>
+          </a:xfrm>
+        </p:spPr>
+        <p:txBody>
+          <a:bodyPr/>
+          <a:lstStyle/>
+          <a:p>
+            <a:r>
+              <a:rPr lang="el-GR" dirty="0" smtClean="0"/>
+              <a:t>Εφαρμογή ταξινομησης σε περισσότερες από δύο κλάσεις</a:t>
+            </a:r>
+          </a:p>
+          <a:p>
+            <a:r>
+              <a:rPr lang="el-GR" dirty="0" smtClean="0"/>
+              <a:t>Εξερεύνηση τεχνικών ανίχνευσης ανωμαλιών</a:t>
+            </a:r>
+          </a:p>
+          <a:p>
+            <a:r>
+              <a:rPr lang="el-GR" dirty="0" smtClean="0"/>
+              <a:t>Ταξινόμηση βάσει πρόβλεψης μελλοντικής χρονοσειράς</a:t>
+            </a:r>
+            <a:endParaRPr lang="el-GR" dirty="0"/>
+          </a:p>
+        </p:txBody>
+      </p:sp>
+    </p:spTree>
+    <p:extLst>
+      <p:ext uri="{BB962C8B-B14F-4D97-AF65-F5344CB8AC3E}">
+        <p14:creationId xmlns:p14="http://schemas.microsoft.com/office/powerpoint/2010/main" val="1323248322"/>
+      </p:ext>
+    </p:extLst>
+  </p:cSld>
+  <p:clrMapOvr>
+    <a:masterClrMapping/>
+  </p:clrMapOvr>
+</p:sld>
+</file>
+
+<file path=ppt/slides/slide19.xml><?xml version="1.0" encoding="utf-8"?>
+<p:sld xmlns:a="http://schemas.openxmlformats.org/drawingml/2006/main" xmlns:r="http://schemas.openxmlformats.org/officeDocument/2006/relationships" xmlns:p="http://schemas.openxmlformats.org/presentationml/2006/main">
+  <p:cSld>
+    <p:spTree>
+      <p:nvGrpSpPr>
+        <p:cNvPr id="1" name=""/>
+        <p:cNvGrpSpPr/>
+        <p:nvPr/>
+      </p:nvGrpSpPr>
+      <p:grpSpPr>
+        <a:xfrm>
+          <a:off x="0" y="0"/>
+          <a:ext cx="0" cy="0"/>
+          <a:chOff x="0" y="0"/>
+          <a:chExt cx="0" cy="0"/>
+        </a:xfrm>
+      </p:grpSpPr>
+      <p:sp>
+        <p:nvSpPr>
+          <p:cNvPr id="7" name="Title 6"/>
+          <p:cNvSpPr>
+            <a:spLocks noGrp="1"/>
+          </p:cNvSpPr>
+          <p:nvPr>
+            <p:ph type="title"/>
+          </p:nvPr>
+        </p:nvSpPr>
+        <p:spPr>
+          <a:xfrm>
+            <a:off x="581191" y="825388"/>
+            <a:ext cx="11029616" cy="566886"/>
+          </a:xfrm>
+        </p:spPr>
+        <p:txBody>
+          <a:bodyPr/>
+          <a:lstStyle/>
+          <a:p>
+            <a:pPr algn="ctr"/>
+            <a:r>
+              <a:rPr lang="el-GR" dirty="0" smtClean="0"/>
+              <a:t>ΕΡΩΤΗΣΕΙΣ</a:t>
+            </a:r>
+            <a:endParaRPr lang="el-GR" dirty="0"/>
+          </a:p>
+        </p:txBody>
+      </p:sp>
+      <p:pic>
+        <p:nvPicPr>
+          <p:cNvPr id="12" name="Content Placeholder 11"/>
+          <p:cNvPicPr>
+            <a:picLocks noGrp="1" noChangeAspect="1"/>
+          </p:cNvPicPr>
+          <p:nvPr>
+            <p:ph idx="1"/>
+          </p:nvPr>
+        </p:nvPicPr>
+        <p:blipFill>
+          <a:blip r:embed="rId2">
+            <a:extLst>
+              <a:ext uri="{28A0092B-C50C-407E-A947-70E740481C1C}">
+                <a14:useLocalDpi xmlns:a14="http://schemas.microsoft.com/office/drawing/2010/main" val="0"/>
+              </a:ext>
+            </a:extLst>
+          </a:blip>
+          <a:stretch>
+            <a:fillRect/>
+          </a:stretch>
+        </p:blipFill>
+        <p:spPr>
+          <a:xfrm>
+            <a:off x="2886737" y="2181225"/>
+            <a:ext cx="6418525" cy="3678238"/>
+          </a:xfrm>
+        </p:spPr>
+      </p:pic>
+    </p:spTree>
+    <p:extLst>
+      <p:ext uri="{BB962C8B-B14F-4D97-AF65-F5344CB8AC3E}">
+        <p14:creationId xmlns:p14="http://schemas.microsoft.com/office/powerpoint/2010/main" val="2008157664"/>
+      </p:ext>
+    </p:extLst>
+  </p:cSld>
+  <p:clrMapOvr>
+    <a:masterClrMapping/>
+  </p:clrMapOvr>
 </p:sld>
 </file>
 
@@ -8057,7 +8860,12 @@
             <p:ph type="title"/>
           </p:nvPr>
         </p:nvSpPr>
-        <p:spPr/>
+        <p:spPr>
+          <a:xfrm>
+            <a:off x="581193" y="865847"/>
+            <a:ext cx="11029616" cy="690302"/>
+          </a:xfrm>
+        </p:spPr>
         <p:txBody>
           <a:bodyPr/>
           <a:lstStyle/>
@@ -9332,6 +10140,13 @@
   <p:clrMapOvr>
     <a:masterClrMapping/>
   </p:clrMapOvr>
+  <p:timing>
+    <p:tnLst>
+      <p:par>
+        <p:cTn id="1" dur="indefinite" restart="never" nodeType="tmRoot"/>
+      </p:par>
+    </p:tnLst>
+  </p:timing>
 </p:sld>
 </file>
 
@@ -9388,7 +10203,7 @@
         </p:nvSpPr>
         <p:spPr>
           <a:xfrm>
-            <a:off x="4805254" y="1828233"/>
+            <a:off x="5072291" y="1828233"/>
             <a:ext cx="6369866" cy="5025154"/>
           </a:xfrm>
         </p:spPr>
@@ -9500,8 +10315,8 @@
         </p:blipFill>
         <p:spPr>
           <a:xfrm>
-            <a:off x="581191" y="2004679"/>
-            <a:ext cx="4224063" cy="1311477"/>
+            <a:off x="581191" y="2197877"/>
+            <a:ext cx="4128374" cy="1311477"/>
           </a:xfrm>
           <a:prstGeom prst="rect">
             <a:avLst/>
@@ -9518,7 +10333,7 @@
         </p:nvSpPr>
         <p:spPr>
           <a:xfrm>
-            <a:off x="581191" y="3428433"/>
+            <a:off x="505033" y="3648834"/>
             <a:ext cx="4224064" cy="2717008"/>
           </a:xfrm>
           <a:prstGeom prst="rect">
@@ -9753,6 +10568,45 @@
           </a:p>
         </p:txBody>
       </p:sp>
+      <p:sp>
+        <p:nvSpPr>
+          <p:cNvPr id="6" name="Rounded Rectangle 5"/>
+          <p:cNvSpPr/>
+          <p:nvPr/>
+        </p:nvSpPr>
+        <p:spPr>
+          <a:xfrm>
+            <a:off x="428878" y="1828233"/>
+            <a:ext cx="4376375" cy="4613027"/>
+          </a:xfrm>
+          <a:prstGeom prst="roundRect">
+            <a:avLst/>
+          </a:prstGeom>
+          <a:noFill/>
+        </p:spPr>
+        <p:style>
+          <a:lnRef idx="2">
+            <a:schemeClr val="accent2"/>
+          </a:lnRef>
+          <a:fillRef idx="1">
+            <a:schemeClr val="lt1"/>
+          </a:fillRef>
+          <a:effectRef idx="0">
+            <a:schemeClr val="accent2"/>
+          </a:effectRef>
+          <a:fontRef idx="minor">
+            <a:schemeClr val="dk1"/>
+          </a:fontRef>
+        </p:style>
+        <p:txBody>
+          <a:bodyPr rtlCol="0" anchor="ctr"/>
+          <a:lstStyle/>
+          <a:p>
+            <a:pPr algn="ctr"/>
+            <a:endParaRPr lang="el-GR"/>
+          </a:p>
+        </p:txBody>
+      </p:sp>
     </p:spTree>
     <p:extLst>
       <p:ext uri="{BB962C8B-B14F-4D97-AF65-F5344CB8AC3E}">
@@ -9763,6 +10617,13 @@
   <p:clrMapOvr>
     <a:masterClrMapping/>
   </p:clrMapOvr>
+  <p:timing>
+    <p:tnLst>
+      <p:par>
+        <p:cTn id="1" dur="indefinite" restart="never" nodeType="tmRoot"/>
+      </p:par>
+    </p:tnLst>
+  </p:timing>
 </p:sld>
 </file>
 
@@ -10206,15 +11067,7 @@
           <a:p>
             <a:r>
               <a:rPr lang="el-GR" sz="2400" dirty="0" smtClean="0"/>
-              <a:t>4.500 οικιακοί </a:t>
-            </a:r>
-            <a:r>
-              <a:rPr lang="el-GR" sz="2400" dirty="0" smtClean="0"/>
-              <a:t>καταναλωτές </a:t>
-            </a:r>
-            <a:r>
-              <a:rPr lang="el-GR" sz="2400" dirty="0" smtClean="0"/>
-              <a:t>και μικρομεσσαίες επιχειρήσεις.</a:t>
+              <a:t>4.500 οικιακοί καταναλωτές και μικρομεσσαίες επιχειρήσεις.</a:t>
             </a:r>
           </a:p>
           <a:p>
@@ -10469,6 +11322,13 @@
   <p:clrMapOvr>
     <a:masterClrMapping/>
   </p:clrMapOvr>
+  <p:timing>
+    <p:tnLst>
+      <p:par>
+        <p:cTn id="1" dur="indefinite" restart="never" nodeType="tmRoot"/>
+      </p:par>
+    </p:tnLst>
+  </p:timing>
 </p:sld>
 </file>
 
@@ -10499,7 +11359,12 @@
             <p:ph type="title"/>
           </p:nvPr>
         </p:nvSpPr>
-        <p:spPr/>
+        <p:spPr>
+          <a:xfrm>
+            <a:off x="581193" y="906307"/>
+            <a:ext cx="11029616" cy="617473"/>
+          </a:xfrm>
+        </p:spPr>
         <p:txBody>
           <a:bodyPr/>
           <a:lstStyle/>
@@ -10525,7 +11390,7 @@
         </p:nvSpPr>
         <p:spPr>
           <a:xfrm>
-            <a:off x="1426133" y="2160571"/>
+            <a:off x="1610418" y="2160570"/>
             <a:ext cx="1155961" cy="358321"/>
           </a:xfrm>
         </p:spPr>
@@ -10565,7 +11430,7 @@
         </p:blipFill>
         <p:spPr>
           <a:xfrm>
-            <a:off x="581193" y="2643188"/>
+            <a:off x="765477" y="2641605"/>
             <a:ext cx="2845842" cy="2134382"/>
           </a:xfrm>
         </p:spPr>
@@ -10582,7 +11447,7 @@
         </p:nvSpPr>
         <p:spPr>
           <a:xfrm>
-            <a:off x="8825456" y="1958272"/>
+            <a:off x="9440237" y="2026168"/>
             <a:ext cx="1246174" cy="560621"/>
           </a:xfrm>
         </p:spPr>
@@ -10599,13 +11464,11 @@
       </p:sp>
       <p:pic>
         <p:nvPicPr>
-          <p:cNvPr id="11" name="Content Placeholder 10"/>
+          <p:cNvPr id="12" name="Content Placeholder 9"/>
           <p:cNvPicPr>
-            <a:picLocks noGrp="1" noChangeAspect="1"/>
+            <a:picLocks noChangeAspect="1"/>
           </p:cNvPicPr>
-          <p:nvPr>
-            <p:ph sz="quarter" idx="4"/>
-          </p:nvPr>
+          <p:nvPr/>
         </p:nvPicPr>
         <p:blipFill>
           <a:blip r:embed="rId3">
@@ -10621,34 +11484,7 @@
         </p:blipFill>
         <p:spPr>
           <a:xfrm>
-            <a:off x="8025622" y="2643189"/>
-            <a:ext cx="2845842" cy="2134382"/>
-          </a:xfrm>
-        </p:spPr>
-      </p:pic>
-      <p:pic>
-        <p:nvPicPr>
-          <p:cNvPr id="12" name="Content Placeholder 9"/>
-          <p:cNvPicPr>
-            <a:picLocks noChangeAspect="1"/>
-          </p:cNvPicPr>
-          <p:nvPr/>
-        </p:nvPicPr>
-        <p:blipFill>
-          <a:blip r:embed="rId4">
-            <a:extLst>
-              <a:ext uri="{28A0092B-C50C-407E-A947-70E740481C1C}">
-                <a14:useLocalDpi xmlns:a14="http://schemas.microsoft.com/office/drawing/2010/main" val="0"/>
-              </a:ext>
-            </a:extLst>
-          </a:blip>
-          <a:stretch>
-            <a:fillRect/>
-          </a:stretch>
-        </p:blipFill>
-        <p:spPr>
-          <a:xfrm>
-            <a:off x="4172062" y="2643188"/>
+            <a:off x="4674134" y="2641605"/>
             <a:ext cx="2843732" cy="2132799"/>
           </a:xfrm>
           <a:prstGeom prst="rect">
@@ -10666,7 +11502,7 @@
         </p:nvSpPr>
         <p:spPr>
           <a:xfrm>
-            <a:off x="5001757" y="2160571"/>
+            <a:off x="5503829" y="2160570"/>
             <a:ext cx="1184342" cy="358321"/>
           </a:xfrm>
           <a:prstGeom prst="rect">
@@ -11132,7 +11968,7 @@
         </p:nvSpPr>
         <p:spPr>
           <a:xfrm>
-            <a:off x="4172062" y="4900283"/>
+            <a:off x="4764233" y="4897117"/>
             <a:ext cx="2843731" cy="1539903"/>
           </a:xfrm>
           <a:prstGeom prst="rect">
@@ -11370,7 +12206,7 @@
         </p:nvSpPr>
         <p:spPr>
           <a:xfrm>
-            <a:off x="8025622" y="4900283"/>
+            <a:off x="8687907" y="4897117"/>
             <a:ext cx="2922902" cy="1539903"/>
           </a:xfrm>
           <a:prstGeom prst="rect">
@@ -11596,6 +12432,152 @@
           </a:p>
         </p:txBody>
       </p:sp>
+      <p:sp>
+        <p:nvSpPr>
+          <p:cNvPr id="2" name="Rounded Rectangle 1"/>
+          <p:cNvSpPr/>
+          <p:nvPr/>
+        </p:nvSpPr>
+        <p:spPr>
+          <a:xfrm>
+            <a:off x="501210" y="1958271"/>
+            <a:ext cx="3374379" cy="4481914"/>
+          </a:xfrm>
+          <a:prstGeom prst="roundRect">
+            <a:avLst/>
+          </a:prstGeom>
+          <a:noFill/>
+        </p:spPr>
+        <p:style>
+          <a:lnRef idx="2">
+            <a:schemeClr val="accent2"/>
+          </a:lnRef>
+          <a:fillRef idx="1">
+            <a:schemeClr val="lt1"/>
+          </a:fillRef>
+          <a:effectRef idx="0">
+            <a:schemeClr val="accent2"/>
+          </a:effectRef>
+          <a:fontRef idx="minor">
+            <a:schemeClr val="dk1"/>
+          </a:fontRef>
+        </p:style>
+        <p:txBody>
+          <a:bodyPr rtlCol="0" anchor="ctr"/>
+          <a:lstStyle/>
+          <a:p>
+            <a:pPr algn="ctr"/>
+            <a:endParaRPr lang="el-GR"/>
+          </a:p>
+        </p:txBody>
+      </p:sp>
+      <p:sp>
+        <p:nvSpPr>
+          <p:cNvPr id="14" name="Rounded Rectangle 13"/>
+          <p:cNvSpPr/>
+          <p:nvPr/>
+        </p:nvSpPr>
+        <p:spPr>
+          <a:xfrm>
+            <a:off x="4408811" y="1958271"/>
+            <a:ext cx="3374379" cy="4481914"/>
+          </a:xfrm>
+          <a:prstGeom prst="roundRect">
+            <a:avLst/>
+          </a:prstGeom>
+          <a:noFill/>
+        </p:spPr>
+        <p:style>
+          <a:lnRef idx="2">
+            <a:schemeClr val="accent2"/>
+          </a:lnRef>
+          <a:fillRef idx="1">
+            <a:schemeClr val="lt1"/>
+          </a:fillRef>
+          <a:effectRef idx="0">
+            <a:schemeClr val="accent2"/>
+          </a:effectRef>
+          <a:fontRef idx="minor">
+            <a:schemeClr val="dk1"/>
+          </a:fontRef>
+        </p:style>
+        <p:txBody>
+          <a:bodyPr rtlCol="0" anchor="ctr"/>
+          <a:lstStyle/>
+          <a:p>
+            <a:pPr algn="ctr"/>
+            <a:endParaRPr lang="el-GR"/>
+          </a:p>
+        </p:txBody>
+      </p:sp>
+      <p:sp>
+        <p:nvSpPr>
+          <p:cNvPr id="18" name="Rounded Rectangle 17"/>
+          <p:cNvSpPr/>
+          <p:nvPr/>
+        </p:nvSpPr>
+        <p:spPr>
+          <a:xfrm>
+            <a:off x="8376136" y="1958271"/>
+            <a:ext cx="3374379" cy="4481914"/>
+          </a:xfrm>
+          <a:prstGeom prst="roundRect">
+            <a:avLst/>
+          </a:prstGeom>
+          <a:noFill/>
+        </p:spPr>
+        <p:style>
+          <a:lnRef idx="2">
+            <a:schemeClr val="accent2"/>
+          </a:lnRef>
+          <a:fillRef idx="1">
+            <a:schemeClr val="lt1"/>
+          </a:fillRef>
+          <a:effectRef idx="0">
+            <a:schemeClr val="accent2"/>
+          </a:effectRef>
+          <a:fontRef idx="minor">
+            <a:schemeClr val="dk1"/>
+          </a:fontRef>
+        </p:style>
+        <p:txBody>
+          <a:bodyPr rtlCol="0" anchor="ctr"/>
+          <a:lstStyle/>
+          <a:p>
+            <a:pPr algn="ctr"/>
+            <a:endParaRPr lang="el-GR"/>
+          </a:p>
+        </p:txBody>
+      </p:sp>
+      <p:pic>
+        <p:nvPicPr>
+          <p:cNvPr id="9" name="Content Placeholder 8"/>
+          <p:cNvPicPr>
+            <a:picLocks noGrp="1" noChangeAspect="1"/>
+          </p:cNvPicPr>
+          <p:nvPr>
+            <p:ph sz="quarter" idx="4"/>
+          </p:nvPr>
+        </p:nvPicPr>
+        <p:blipFill>
+          <a:blip r:embed="rId4">
+            <a:extLst>
+              <a:ext uri="{28A0092B-C50C-407E-A947-70E740481C1C}">
+                <a14:useLocalDpi xmlns:a14="http://schemas.microsoft.com/office/drawing/2010/main" val="0"/>
+              </a:ext>
+            </a:extLst>
+          </a:blip>
+          <a:stretch>
+            <a:fillRect/>
+          </a:stretch>
+        </p:blipFill>
+        <p:spPr>
+          <a:xfrm>
+            <a:off x="8728560" y="2706930"/>
+            <a:ext cx="2669529" cy="2002147"/>
+          </a:xfrm>
+        </p:spPr>
+      </p:pic>
     </p:spTree>
     <p:extLst>
       <p:ext uri="{BB962C8B-B14F-4D97-AF65-F5344CB8AC3E}">
@@ -11606,6 +12588,13 @@
   <p:clrMapOvr>
     <a:masterClrMapping/>
   </p:clrMapOvr>
+  <p:timing>
+    <p:tnLst>
+      <p:par>
+        <p:cTn id="1" dur="indefinite" restart="never" nodeType="tmRoot"/>
+      </p:par>
+    </p:tnLst>
+  </p:timing>
 </p:sld>
 </file>
 
@@ -11662,7 +12651,7 @@
         </p:nvSpPr>
         <p:spPr>
           <a:xfrm>
-            <a:off x="5542013" y="1727101"/>
+            <a:off x="5910868" y="1634142"/>
             <a:ext cx="5422392" cy="2773939"/>
           </a:xfrm>
         </p:spPr>
@@ -11728,8 +12717,8 @@
         </p:blipFill>
         <p:spPr>
           <a:xfrm>
-            <a:off x="314794" y="2018496"/>
-            <a:ext cx="5227220" cy="3920415"/>
+            <a:off x="177887" y="2018496"/>
+            <a:ext cx="5455432" cy="4091574"/>
           </a:xfrm>
         </p:spPr>
       </p:pic>
@@ -11793,6 +12782,45 @@
           </a:prstGeom>
         </p:spPr>
       </p:pic>
+      <p:sp>
+        <p:nvSpPr>
+          <p:cNvPr id="9" name="Rounded Rectangle 8"/>
+          <p:cNvSpPr/>
+          <p:nvPr/>
+        </p:nvSpPr>
+        <p:spPr>
+          <a:xfrm>
+            <a:off x="5437848" y="4324233"/>
+            <a:ext cx="6368432" cy="2515544"/>
+          </a:xfrm>
+          <a:prstGeom prst="roundRect">
+            <a:avLst/>
+          </a:prstGeom>
+          <a:noFill/>
+        </p:spPr>
+        <p:style>
+          <a:lnRef idx="2">
+            <a:schemeClr val="accent2"/>
+          </a:lnRef>
+          <a:fillRef idx="1">
+            <a:schemeClr val="lt1"/>
+          </a:fillRef>
+          <a:effectRef idx="0">
+            <a:schemeClr val="accent2"/>
+          </a:effectRef>
+          <a:fontRef idx="minor">
+            <a:schemeClr val="dk1"/>
+          </a:fontRef>
+        </p:style>
+        <p:txBody>
+          <a:bodyPr rtlCol="0" anchor="ctr"/>
+          <a:lstStyle/>
+          <a:p>
+            <a:pPr algn="ctr"/>
+            <a:endParaRPr lang="el-GR"/>
+          </a:p>
+        </p:txBody>
+      </p:sp>
     </p:spTree>
     <p:extLst>
       <p:ext uri="{BB962C8B-B14F-4D97-AF65-F5344CB8AC3E}">
@@ -11803,6 +12831,13 @@
   <p:clrMapOvr>
     <a:masterClrMapping/>
   </p:clrMapOvr>
+  <p:timing>
+    <p:tnLst>
+      <p:par>
+        <p:cTn id="1" dur="indefinite" restart="never" nodeType="tmRoot"/>
+      </p:par>
+    </p:tnLst>
+  </p:timing>
 </p:sld>
 </file>
 
@@ -11859,8 +12894,8 @@
         </p:nvSpPr>
         <p:spPr>
           <a:xfrm>
-            <a:off x="154443" y="1844245"/>
-            <a:ext cx="3659071" cy="536005"/>
+            <a:off x="610913" y="1861735"/>
+            <a:ext cx="3215250" cy="536005"/>
           </a:xfrm>
         </p:spPr>
         <p:txBody>
@@ -11868,12 +12903,8 @@
           <a:lstStyle/>
           <a:p>
             <a:r>
-              <a:rPr lang="el-GR" sz="2400" dirty="0"/>
-              <a:t>Επιβλεπόμενοι </a:t>
-            </a:r>
-            <a:r>
               <a:rPr lang="el-GR" sz="2400" dirty="0" smtClean="0"/>
-              <a:t>αλγόριθμοι</a:t>
+              <a:t>Επιβλεπόμενη μάθηση</a:t>
             </a:r>
             <a:endParaRPr lang="el-GR" sz="2400" dirty="0"/>
           </a:p>
@@ -11903,8 +12934,8 @@
         </p:blipFill>
         <p:spPr>
           <a:xfrm>
-            <a:off x="4437892" y="2380249"/>
-            <a:ext cx="2771429" cy="2866667"/>
+            <a:off x="4528420" y="2423275"/>
+            <a:ext cx="2961002" cy="2866667"/>
           </a:xfrm>
         </p:spPr>
       </p:pic>
@@ -11920,7 +12951,7 @@
         </p:nvSpPr>
         <p:spPr>
           <a:xfrm>
-            <a:off x="3813514" y="1857135"/>
+            <a:off x="4235651" y="1848956"/>
             <a:ext cx="4020187" cy="553373"/>
           </a:xfrm>
         </p:spPr>
@@ -11930,11 +12961,11 @@
           <a:p>
             <a:r>
               <a:rPr lang="el-GR" sz="2400" dirty="0"/>
-              <a:t>Μη επιβλεπόμενα </a:t>
+              <a:t>Μη </a:t>
             </a:r>
             <a:r>
               <a:rPr lang="el-GR" sz="2400" dirty="0" smtClean="0"/>
-              <a:t>συστήματα</a:t>
+              <a:t>επιβλεπόμενη μάθηση</a:t>
             </a:r>
             <a:endParaRPr lang="el-GR" sz="2400" dirty="0"/>
           </a:p>
@@ -11964,8 +12995,8 @@
         </p:blipFill>
         <p:spPr>
           <a:xfrm>
-            <a:off x="8495312" y="2410508"/>
-            <a:ext cx="2771429" cy="2866667"/>
+            <a:off x="8367166" y="2423275"/>
+            <a:ext cx="3091156" cy="2866667"/>
           </a:xfrm>
         </p:spPr>
       </p:pic>
@@ -11979,8 +13010,8 @@
         </p:nvSpPr>
         <p:spPr>
           <a:xfrm>
-            <a:off x="7833701" y="1844245"/>
-            <a:ext cx="4094653" cy="553495"/>
+            <a:off x="8103468" y="1844245"/>
+            <a:ext cx="3777108" cy="553495"/>
           </a:xfrm>
           <a:prstGeom prst="rect">
             <a:avLst/>
@@ -12193,7 +13224,7 @@
           <a:p>
             <a:r>
               <a:rPr lang="el-GR" sz="2400" dirty="0" smtClean="0"/>
-              <a:t>Ημι-επιβλεπόμενα συστήματα</a:t>
+              <a:t>Ημι-επιβλεπόμενη μάθηση</a:t>
             </a:r>
             <a:endParaRPr lang="el-GR" sz="2400" dirty="0"/>
           </a:p>
@@ -12221,8 +13252,8 @@
         </p:blipFill>
         <p:spPr>
           <a:xfrm>
-            <a:off x="598264" y="2380250"/>
-            <a:ext cx="2771429" cy="2866667"/>
+            <a:off x="707432" y="2423275"/>
+            <a:ext cx="2884171" cy="2866667"/>
           </a:xfrm>
           <a:prstGeom prst="rect">
             <a:avLst/>
@@ -12239,8 +13270,8 @@
         </p:nvSpPr>
         <p:spPr>
           <a:xfrm>
-            <a:off x="610127" y="5277175"/>
-            <a:ext cx="2759566" cy="1662913"/>
+            <a:off x="699018" y="5289942"/>
+            <a:ext cx="2884171" cy="1662913"/>
           </a:xfrm>
           <a:prstGeom prst="rect">
             <a:avLst/>
@@ -12453,7 +13484,15 @@
           <a:p>
             <a:r>
               <a:rPr lang="el-GR" dirty="0" smtClean="0"/>
-              <a:t>Εκπαίδευση με ζευγάρια παραδειγμάτων και γνωστών αποτελεσμάτων</a:t>
+              <a:t>Εκπαίδευση με 70% των </a:t>
+            </a:r>
+            <a:r>
+              <a:rPr lang="en-US" dirty="0" smtClean="0"/>
+              <a:t>labels</a:t>
+            </a:r>
+            <a:r>
+              <a:rPr lang="el-GR" dirty="0" smtClean="0"/>
+              <a:t> και πρόβλεψη στο 30% των δεδομένων.</a:t>
             </a:r>
             <a:endParaRPr lang="el-GR" dirty="0"/>
           </a:p>
@@ -12469,8 +13508,8 @@
         </p:nvSpPr>
         <p:spPr>
           <a:xfrm>
-            <a:off x="4437892" y="5262045"/>
-            <a:ext cx="2759566" cy="1693172"/>
+            <a:off x="4534352" y="5289942"/>
+            <a:ext cx="2949138" cy="1062306"/>
           </a:xfrm>
           <a:prstGeom prst="rect">
             <a:avLst/>
@@ -12683,7 +13722,15 @@
           <a:p>
             <a:r>
               <a:rPr lang="el-GR" dirty="0" smtClean="0"/>
-              <a:t>Τα δεδομένα δεν έχουν γνωστά αποτελέσματα</a:t>
+              <a:t>Πρόβλεψη μέσω κανόνων χωρίς τη χρήση </a:t>
+            </a:r>
+            <a:r>
+              <a:rPr lang="en-US" dirty="0" smtClean="0"/>
+              <a:t>labels</a:t>
+            </a:r>
+            <a:r>
+              <a:rPr lang="el-GR" dirty="0" smtClean="0"/>
+              <a:t>.</a:t>
             </a:r>
             <a:endParaRPr lang="el-GR" dirty="0"/>
           </a:p>
@@ -12699,8 +13746,8 @@
         </p:nvSpPr>
         <p:spPr>
           <a:xfrm>
-            <a:off x="8495312" y="5289943"/>
-            <a:ext cx="2759566" cy="1402170"/>
+            <a:off x="8367166" y="5289943"/>
+            <a:ext cx="3091156" cy="1402170"/>
           </a:xfrm>
           <a:prstGeom prst="rect">
             <a:avLst/>
@@ -12913,17 +13960,134 @@
           <a:p>
             <a:r>
               <a:rPr lang="el-GR" dirty="0" smtClean="0"/>
-              <a:t>Τα δεδομένα είναι μια μίξη </a:t>
+              <a:t>Βελτιστοποίηση ταξινόμησης με 30% των </a:t>
+            </a:r>
+            <a:r>
+              <a:rPr lang="en-US" dirty="0" smtClean="0"/>
+              <a:t>labels</a:t>
             </a:r>
             <a:r>
               <a:rPr lang="el-GR" dirty="0" smtClean="0"/>
-              <a:t>από </a:t>
-            </a:r>
-            <a:r>
-              <a:rPr lang="el-GR" dirty="0" smtClean="0"/>
-              <a:t>γνωστά και άγνωστα αποτελέσματα</a:t>
+              <a:t> πρόβλεψη στο 70% των δεδομένων.</a:t>
             </a:r>
             <a:endParaRPr lang="el-GR" dirty="0"/>
+          </a:p>
+        </p:txBody>
+      </p:sp>
+      <p:sp>
+        <p:nvSpPr>
+          <p:cNvPr id="15" name="Rectangle 14"/>
+          <p:cNvSpPr/>
+          <p:nvPr/>
+        </p:nvSpPr>
+        <p:spPr>
+          <a:xfrm>
+            <a:off x="4235651" y="1974457"/>
+            <a:ext cx="3546540" cy="4612460"/>
+          </a:xfrm>
+          <a:prstGeom prst="rect">
+            <a:avLst/>
+          </a:prstGeom>
+          <a:noFill/>
+        </p:spPr>
+        <p:style>
+          <a:lnRef idx="2">
+            <a:schemeClr val="dk1"/>
+          </a:lnRef>
+          <a:fillRef idx="1">
+            <a:schemeClr val="lt1"/>
+          </a:fillRef>
+          <a:effectRef idx="0">
+            <a:schemeClr val="dk1"/>
+          </a:effectRef>
+          <a:fontRef idx="minor">
+            <a:schemeClr val="dk1"/>
+          </a:fontRef>
+        </p:style>
+        <p:txBody>
+          <a:bodyPr rtlCol="0" anchor="ctr"/>
+          <a:lstStyle/>
+          <a:p>
+            <a:pPr algn="ctr"/>
+            <a:endParaRPr lang="el-GR"/>
+          </a:p>
+        </p:txBody>
+      </p:sp>
+      <p:sp>
+        <p:nvSpPr>
+          <p:cNvPr id="16" name="Rectangle 15"/>
+          <p:cNvSpPr/>
+          <p:nvPr/>
+        </p:nvSpPr>
+        <p:spPr>
+          <a:xfrm>
+            <a:off x="367834" y="1974457"/>
+            <a:ext cx="3546540" cy="4612460"/>
+          </a:xfrm>
+          <a:prstGeom prst="rect">
+            <a:avLst/>
+          </a:prstGeom>
+          <a:noFill/>
+        </p:spPr>
+        <p:style>
+          <a:lnRef idx="2">
+            <a:schemeClr val="dk1"/>
+          </a:lnRef>
+          <a:fillRef idx="1">
+            <a:schemeClr val="lt1"/>
+          </a:fillRef>
+          <a:effectRef idx="0">
+            <a:schemeClr val="dk1"/>
+          </a:effectRef>
+          <a:fontRef idx="minor">
+            <a:schemeClr val="dk1"/>
+          </a:fontRef>
+        </p:style>
+        <p:txBody>
+          <a:bodyPr rtlCol="0" anchor="ctr"/>
+          <a:lstStyle/>
+          <a:p>
+            <a:pPr algn="ctr"/>
+            <a:endParaRPr lang="el-GR"/>
+          </a:p>
+        </p:txBody>
+      </p:sp>
+      <p:sp>
+        <p:nvSpPr>
+          <p:cNvPr id="17" name="Rectangle 16"/>
+          <p:cNvSpPr/>
+          <p:nvPr/>
+        </p:nvSpPr>
+        <p:spPr>
+          <a:xfrm>
+            <a:off x="8139474" y="1974457"/>
+            <a:ext cx="3546540" cy="4612460"/>
+          </a:xfrm>
+          <a:prstGeom prst="rect">
+            <a:avLst/>
+          </a:prstGeom>
+          <a:noFill/>
+        </p:spPr>
+        <p:style>
+          <a:lnRef idx="2">
+            <a:schemeClr val="dk1"/>
+          </a:lnRef>
+          <a:fillRef idx="1">
+            <a:schemeClr val="lt1"/>
+          </a:fillRef>
+          <a:effectRef idx="0">
+            <a:schemeClr val="dk1"/>
+          </a:effectRef>
+          <a:fontRef idx="minor">
+            <a:schemeClr val="dk1"/>
+          </a:fontRef>
+        </p:style>
+        <p:txBody>
+          <a:bodyPr rtlCol="0" anchor="ctr"/>
+          <a:lstStyle/>
+          <a:p>
+            <a:pPr algn="ctr"/>
+            <a:endParaRPr lang="el-GR"/>
           </a:p>
         </p:txBody>
       </p:sp>
@@ -12937,6 +14101,13 @@
   <p:clrMapOvr>
     <a:masterClrMapping/>
   </p:clrMapOvr>
+  <p:timing>
+    <p:tnLst>
+      <p:par>
+        <p:cTn id="1" dur="indefinite" restart="never" nodeType="tmRoot"/>
+      </p:par>
+    </p:tnLst>
+  </p:timing>
 </p:sld>
 </file>
 
@@ -12967,7 +14138,12 @@
             <p:ph type="title"/>
           </p:nvPr>
         </p:nvSpPr>
-        <p:spPr/>
+        <p:spPr>
+          <a:xfrm>
+            <a:off x="497527" y="887507"/>
+            <a:ext cx="11029616" cy="609381"/>
+          </a:xfrm>
+        </p:spPr>
         <p:txBody>
           <a:bodyPr/>
           <a:lstStyle/>
@@ -13005,7 +14181,7 @@
         </p:blipFill>
         <p:spPr>
           <a:xfrm>
-            <a:off x="581193" y="2451888"/>
+            <a:off x="497527" y="2455535"/>
             <a:ext cx="3930520" cy="3530190"/>
           </a:xfrm>
         </p:spPr>
@@ -14174,6 +15350,45 @@
           </p:sp>
         </mc:Fallback>
       </mc:AlternateContent>
+      <p:sp>
+        <p:nvSpPr>
+          <p:cNvPr id="8" name="Rounded Rectangle 7"/>
+          <p:cNvSpPr/>
+          <p:nvPr/>
+        </p:nvSpPr>
+        <p:spPr>
+          <a:xfrm>
+            <a:off x="474878" y="2206266"/>
+            <a:ext cx="4163088" cy="4176862"/>
+          </a:xfrm>
+          <a:prstGeom prst="roundRect">
+            <a:avLst/>
+          </a:prstGeom>
+          <a:noFill/>
+        </p:spPr>
+        <p:style>
+          <a:lnRef idx="2">
+            <a:schemeClr val="accent2"/>
+          </a:lnRef>
+          <a:fillRef idx="1">
+            <a:schemeClr val="lt1"/>
+          </a:fillRef>
+          <a:effectRef idx="0">
+            <a:schemeClr val="accent2"/>
+          </a:effectRef>
+          <a:fontRef idx="minor">
+            <a:schemeClr val="dk1"/>
+          </a:fontRef>
+        </p:style>
+        <p:txBody>
+          <a:bodyPr rtlCol="0" anchor="ctr"/>
+          <a:lstStyle/>
+          <a:p>
+            <a:pPr algn="ctr"/>
+            <a:endParaRPr lang="el-GR"/>
+          </a:p>
+        </p:txBody>
+      </p:sp>
     </p:spTree>
     <p:extLst>
       <p:ext uri="{BB962C8B-B14F-4D97-AF65-F5344CB8AC3E}">
@@ -14184,6 +15399,13 @@
   <p:clrMapOvr>
     <a:masterClrMapping/>
   </p:clrMapOvr>
+  <p:timing>
+    <p:tnLst>
+      <p:par>
+        <p:cTn id="1" dur="indefinite" restart="never" nodeType="tmRoot"/>
+      </p:par>
+    </p:tnLst>
+  </p:timing>
 </p:sld>
 </file>
 
@@ -14240,7 +15462,7 @@
         </p:nvSpPr>
         <p:spPr>
           <a:xfrm>
-            <a:off x="581193" y="2054018"/>
+            <a:off x="433644" y="1804490"/>
             <a:ext cx="5087075" cy="536005"/>
           </a:xfrm>
         </p:spPr>
@@ -14268,13 +15490,13 @@
         </p:nvSpPr>
         <p:spPr>
           <a:xfrm>
-            <a:off x="581193" y="2594849"/>
-            <a:ext cx="5471648" cy="3183435"/>
+            <a:off x="890046" y="2215102"/>
+            <a:ext cx="3820874" cy="2970271"/>
           </a:xfrm>
         </p:spPr>
         <p:txBody>
           <a:bodyPr>
-            <a:normAutofit lnSpcReduction="10000"/>
+            <a:normAutofit fontScale="92500" lnSpcReduction="10000"/>
           </a:bodyPr>
           <a:lstStyle/>
           <a:p>
@@ -14387,7 +15609,7 @@
         </p:nvSpPr>
         <p:spPr>
           <a:xfrm>
-            <a:off x="5724282" y="1842006"/>
+            <a:off x="5804571" y="4144105"/>
             <a:ext cx="5193824" cy="424023"/>
           </a:xfrm>
         </p:spPr>
@@ -14426,13 +15648,13 @@
             <p:ph sz="quarter" idx="4"/>
             <p:extLst>
               <p:ext uri="{D42A27DB-BD31-4B8C-83A1-F6EECF244321}">
-                <p14:modId xmlns:p14="http://schemas.microsoft.com/office/powerpoint/2010/main" val="3463490586"/>
+                <p14:modId xmlns:p14="http://schemas.microsoft.com/office/powerpoint/2010/main" val="4511262"/>
               </p:ext>
             </p:extLst>
           </p:nvPr>
         </p:nvGraphicFramePr>
         <p:xfrm>
-          <a:off x="5525366" y="2217459"/>
+          <a:off x="5705113" y="4551614"/>
           <a:ext cx="5392740" cy="1854200"/>
         </p:xfrm>
         <a:graphic>
@@ -14923,7 +16145,7 @@
         </p:nvSpPr>
         <p:spPr>
           <a:xfrm>
-            <a:off x="5440430" y="4104027"/>
+            <a:off x="5520719" y="1829972"/>
             <a:ext cx="5761528" cy="424023"/>
           </a:xfrm>
           <a:prstGeom prst="rect">
@@ -15161,13 +16383,13 @@
           <p:nvPr>
             <p:extLst>
               <p:ext uri="{D42A27DB-BD31-4B8C-83A1-F6EECF244321}">
-                <p14:modId xmlns:p14="http://schemas.microsoft.com/office/powerpoint/2010/main" val="1757813966"/>
+                <p14:modId xmlns:p14="http://schemas.microsoft.com/office/powerpoint/2010/main" val="165136361"/>
               </p:ext>
             </p:extLst>
           </p:nvPr>
         </p:nvGraphicFramePr>
         <p:xfrm>
-          <a:off x="5065844" y="4495682"/>
+          <a:off x="5156032" y="2253995"/>
           <a:ext cx="6490902" cy="1854200"/>
         </p:xfrm>
         <a:graphic>
@@ -15672,6 +16894,296 @@
           </a:graphicData>
         </a:graphic>
       </p:graphicFrame>
+      <p:sp>
+        <p:nvSpPr>
+          <p:cNvPr id="9" name="Content Placeholder 4"/>
+          <p:cNvSpPr txBox="1">
+            <a:spLocks/>
+          </p:cNvSpPr>
+          <p:nvPr/>
+        </p:nvSpPr>
+        <p:spPr>
+          <a:xfrm>
+            <a:off x="1263636" y="5023847"/>
+            <a:ext cx="3333996" cy="1719557"/>
+          </a:xfrm>
+          <a:prstGeom prst="rect">
+            <a:avLst/>
+          </a:prstGeom>
+        </p:spPr>
+        <p:txBody>
+          <a:bodyPr vert="horz" lIns="91440" tIns="45720" rIns="91440" bIns="45720" rtlCol="0" anchor="ctr">
+            <a:normAutofit fontScale="77500" lnSpcReduction="20000"/>
+          </a:bodyPr>
+          <a:lstStyle>
+            <a:lvl1pPr marL="306000" indent="-306000" algn="l" defTabSz="457200" rtl="0" eaLnBrk="1" latinLnBrk="0" hangingPunct="1">
+              <a:spcBef>
+                <a:spcPct val="20000"/>
+              </a:spcBef>
+              <a:spcAft>
+                <a:spcPts val="600"/>
+              </a:spcAft>
+              <a:buClr>
+                <a:schemeClr val="accent2"/>
+              </a:buClr>
+              <a:buSzPct val="92000"/>
+              <a:buFont typeface="Wingdings 2" panose="05020102010507070707" pitchFamily="18" charset="2"/>
+              <a:buChar char=""/>
+              <a:defRPr sz="1800" kern="1200">
+                <a:solidFill>
+                  <a:schemeClr val="tx2"/>
+                </a:solidFill>
+                <a:latin typeface="+mn-lt"/>
+                <a:ea typeface="+mn-ea"/>
+                <a:cs typeface="+mn-cs"/>
+              </a:defRPr>
+            </a:lvl1pPr>
+            <a:lvl2pPr marL="630000" indent="-306000" algn="l" defTabSz="457200" rtl="0" eaLnBrk="1" latinLnBrk="0" hangingPunct="1">
+              <a:spcBef>
+                <a:spcPct val="20000"/>
+              </a:spcBef>
+              <a:spcAft>
+                <a:spcPts val="600"/>
+              </a:spcAft>
+              <a:buClr>
+                <a:schemeClr val="accent2"/>
+              </a:buClr>
+              <a:buSzPct val="92000"/>
+              <a:buFont typeface="Wingdings 2" panose="05020102010507070707" pitchFamily="18" charset="2"/>
+              <a:buChar char=""/>
+              <a:defRPr sz="1600" kern="1200">
+                <a:solidFill>
+                  <a:schemeClr val="tx2"/>
+                </a:solidFill>
+                <a:latin typeface="+mn-lt"/>
+                <a:ea typeface="+mn-ea"/>
+                <a:cs typeface="+mn-cs"/>
+              </a:defRPr>
+            </a:lvl2pPr>
+            <a:lvl3pPr marL="900000" indent="-270000" algn="l" defTabSz="457200" rtl="0" eaLnBrk="1" latinLnBrk="0" hangingPunct="1">
+              <a:spcBef>
+                <a:spcPct val="20000"/>
+              </a:spcBef>
+              <a:spcAft>
+                <a:spcPts val="600"/>
+              </a:spcAft>
+              <a:buClr>
+                <a:schemeClr val="accent2"/>
+              </a:buClr>
+              <a:buSzPct val="92000"/>
+              <a:buFont typeface="Wingdings 2" panose="05020102010507070707" pitchFamily="18" charset="2"/>
+              <a:buChar char=""/>
+              <a:defRPr sz="1400" kern="1200">
+                <a:solidFill>
+                  <a:schemeClr val="tx2"/>
+                </a:solidFill>
+                <a:latin typeface="+mn-lt"/>
+                <a:ea typeface="+mn-ea"/>
+                <a:cs typeface="+mn-cs"/>
+              </a:defRPr>
+            </a:lvl3pPr>
+            <a:lvl4pPr marL="1242000" indent="-234000" algn="l" defTabSz="457200" rtl="0" eaLnBrk="1" latinLnBrk="0" hangingPunct="1">
+              <a:spcBef>
+                <a:spcPct val="20000"/>
+              </a:spcBef>
+              <a:spcAft>
+                <a:spcPts val="600"/>
+              </a:spcAft>
+              <a:buClr>
+                <a:schemeClr val="accent2"/>
+              </a:buClr>
+              <a:buSzPct val="92000"/>
+              <a:buFont typeface="Wingdings 2" panose="05020102010507070707" pitchFamily="18" charset="2"/>
+              <a:buChar char=""/>
+              <a:defRPr sz="1200" kern="1200">
+                <a:solidFill>
+                  <a:schemeClr val="tx2"/>
+                </a:solidFill>
+                <a:latin typeface="+mn-lt"/>
+                <a:ea typeface="+mn-ea"/>
+                <a:cs typeface="+mn-cs"/>
+              </a:defRPr>
+            </a:lvl4pPr>
+            <a:lvl5pPr marL="1602000" indent="-234000" algn="l" defTabSz="457200" rtl="0" eaLnBrk="1" latinLnBrk="0" hangingPunct="1">
+              <a:spcBef>
+                <a:spcPct val="20000"/>
+              </a:spcBef>
+              <a:spcAft>
+                <a:spcPts val="600"/>
+              </a:spcAft>
+              <a:buClr>
+                <a:schemeClr val="accent2"/>
+              </a:buClr>
+              <a:buSzPct val="92000"/>
+              <a:buFont typeface="Wingdings 2" panose="05020102010507070707" pitchFamily="18" charset="2"/>
+              <a:buChar char=""/>
+              <a:defRPr sz="1200" kern="1200">
+                <a:solidFill>
+                  <a:schemeClr val="tx2"/>
+                </a:solidFill>
+                <a:latin typeface="+mn-lt"/>
+                <a:ea typeface="+mn-ea"/>
+                <a:cs typeface="+mn-cs"/>
+              </a:defRPr>
+            </a:lvl5pPr>
+            <a:lvl6pPr marL="1900000" indent="-228600" algn="l" defTabSz="457200" rtl="0" eaLnBrk="1" latinLnBrk="0" hangingPunct="1">
+              <a:spcBef>
+                <a:spcPct val="20000"/>
+              </a:spcBef>
+              <a:spcAft>
+                <a:spcPts val="600"/>
+              </a:spcAft>
+              <a:buClr>
+                <a:schemeClr val="accent2"/>
+              </a:buClr>
+              <a:buSzPct val="92000"/>
+              <a:buFont typeface="Wingdings 2" panose="05020102010507070707" pitchFamily="18" charset="2"/>
+              <a:buChar char=""/>
+              <a:defRPr sz="1200" kern="1200">
+                <a:solidFill>
+                  <a:schemeClr val="tx2"/>
+                </a:solidFill>
+                <a:latin typeface="+mn-lt"/>
+                <a:ea typeface="+mn-ea"/>
+                <a:cs typeface="+mn-cs"/>
+              </a:defRPr>
+            </a:lvl6pPr>
+            <a:lvl7pPr marL="2200000" indent="-228600" algn="l" defTabSz="457200" rtl="0" eaLnBrk="1" latinLnBrk="0" hangingPunct="1">
+              <a:spcBef>
+                <a:spcPct val="20000"/>
+              </a:spcBef>
+              <a:spcAft>
+                <a:spcPts val="600"/>
+              </a:spcAft>
+              <a:buClr>
+                <a:schemeClr val="accent2"/>
+              </a:buClr>
+              <a:buSzPct val="92000"/>
+              <a:buFont typeface="Wingdings 2" panose="05020102010507070707" pitchFamily="18" charset="2"/>
+              <a:buChar char=""/>
+              <a:defRPr sz="1200" kern="1200">
+                <a:solidFill>
+                  <a:schemeClr val="tx2"/>
+                </a:solidFill>
+                <a:latin typeface="+mn-lt"/>
+                <a:ea typeface="+mn-ea"/>
+                <a:cs typeface="+mn-cs"/>
+              </a:defRPr>
+            </a:lvl7pPr>
+            <a:lvl8pPr marL="2500000" indent="-228600" algn="l" defTabSz="457200" rtl="0" eaLnBrk="1" latinLnBrk="0" hangingPunct="1">
+              <a:spcBef>
+                <a:spcPct val="20000"/>
+              </a:spcBef>
+              <a:spcAft>
+                <a:spcPts val="600"/>
+              </a:spcAft>
+              <a:buClr>
+                <a:schemeClr val="accent2"/>
+              </a:buClr>
+              <a:buSzPct val="92000"/>
+              <a:buFont typeface="Wingdings 2" panose="05020102010507070707" pitchFamily="18" charset="2"/>
+              <a:buChar char=""/>
+              <a:defRPr sz="1200" kern="1200">
+                <a:solidFill>
+                  <a:schemeClr val="tx2"/>
+                </a:solidFill>
+                <a:latin typeface="+mn-lt"/>
+                <a:ea typeface="+mn-ea"/>
+                <a:cs typeface="+mn-cs"/>
+              </a:defRPr>
+            </a:lvl8pPr>
+            <a:lvl9pPr marL="2800000" indent="-228600" algn="l" defTabSz="457200" rtl="0" eaLnBrk="1" latinLnBrk="0" hangingPunct="1">
+              <a:spcBef>
+                <a:spcPct val="20000"/>
+              </a:spcBef>
+              <a:spcAft>
+                <a:spcPts val="600"/>
+              </a:spcAft>
+              <a:buClr>
+                <a:schemeClr val="accent2"/>
+              </a:buClr>
+              <a:buSzPct val="92000"/>
+              <a:buFont typeface="Wingdings 2" panose="05020102010507070707" pitchFamily="18" charset="2"/>
+              <a:buChar char=""/>
+              <a:defRPr sz="1200" kern="1200">
+                <a:solidFill>
+                  <a:schemeClr val="tx2"/>
+                </a:solidFill>
+                <a:latin typeface="+mn-lt"/>
+                <a:ea typeface="+mn-ea"/>
+                <a:cs typeface="+mn-cs"/>
+              </a:defRPr>
+            </a:lvl9pPr>
+          </a:lstStyle>
+          <a:p>
+            <a:pPr marL="0" indent="0">
+              <a:buNone/>
+            </a:pPr>
+            <a:r>
+              <a:rPr lang="el-GR" sz="2000" dirty="0" smtClean="0"/>
+              <a:t>Λεπτομέρειες δοκιμής</a:t>
+            </a:r>
+          </a:p>
+          <a:p>
+            <a:r>
+              <a:rPr lang="el-GR" sz="2000" dirty="0" smtClean="0"/>
+              <a:t>4.500 χρονοσειρές με ωριαίες μετρήσεις</a:t>
+            </a:r>
+          </a:p>
+          <a:p>
+            <a:r>
+              <a:rPr lang="el-GR" sz="2000" dirty="0" smtClean="0"/>
+              <a:t>10% καταναλωτών με μη τεχνικές απώλειες</a:t>
+            </a:r>
+          </a:p>
+          <a:p>
+            <a:r>
+              <a:rPr lang="el-GR" sz="2000" dirty="0" smtClean="0"/>
+              <a:t>70% εκπαίδευση 30% πρόβλεψη</a:t>
+            </a:r>
+            <a:endParaRPr lang="el-GR" sz="2000" dirty="0"/>
+          </a:p>
+        </p:txBody>
+      </p:sp>
+      <p:sp>
+        <p:nvSpPr>
+          <p:cNvPr id="10" name="Rounded Rectangle 9"/>
+          <p:cNvSpPr/>
+          <p:nvPr/>
+        </p:nvSpPr>
+        <p:spPr>
+          <a:xfrm>
+            <a:off x="316229" y="1930520"/>
+            <a:ext cx="4741932" cy="3081893"/>
+          </a:xfrm>
+          <a:prstGeom prst="roundRect">
+            <a:avLst/>
+          </a:prstGeom>
+          <a:noFill/>
+        </p:spPr>
+        <p:style>
+          <a:lnRef idx="2">
+            <a:schemeClr val="accent2"/>
+          </a:lnRef>
+          <a:fillRef idx="1">
+            <a:schemeClr val="lt1"/>
+          </a:fillRef>
+          <a:effectRef idx="0">
+            <a:schemeClr val="accent2"/>
+          </a:effectRef>
+          <a:fontRef idx="minor">
+            <a:schemeClr val="dk1"/>
+          </a:fontRef>
+        </p:style>
+        <p:txBody>
+          <a:bodyPr rtlCol="0" anchor="ctr"/>
+          <a:lstStyle/>
+          <a:p>
+            <a:pPr algn="ctr"/>
+            <a:endParaRPr lang="el-GR"/>
+          </a:p>
+        </p:txBody>
+      </p:sp>
     </p:spTree>
     <p:extLst>
       <p:ext uri="{BB962C8B-B14F-4D97-AF65-F5344CB8AC3E}">
@@ -15682,6 +17194,13 @@
   <p:clrMapOvr>
     <a:masterClrMapping/>
   </p:clrMapOvr>
+  <p:timing>
+    <p:tnLst>
+      <p:par>
+        <p:cTn id="1" dur="indefinite" restart="never" nodeType="tmRoot"/>
+      </p:par>
+    </p:tnLst>
+  </p:timing>
 </p:sld>
 </file>
 

</xml_diff>